<commit_message>
Fixed slides for pdf export
</commit_message>
<xml_diff>
--- a/src/Documentation/Slides/Slides.pptx
+++ b/src/Documentation/Slides/Slides.pptx
@@ -4,6 +4,12 @@
   <p:sldMasterIdLst>
     <p:sldMasterId id="2147483648" r:id="rId1"/>
   </p:sldMasterIdLst>
+  <p:notesMasterIdLst>
+    <p:notesMasterId r:id="rId34"/>
+  </p:notesMasterIdLst>
+  <p:handoutMasterIdLst>
+    <p:handoutMasterId r:id="rId35"/>
+  </p:handoutMasterIdLst>
   <p:sldIdLst>
     <p:sldId id="285" r:id="rId2"/>
     <p:sldId id="268" r:id="rId3"/>
@@ -39,7 +45,7 @@
     <p:sldId id="307" r:id="rId33"/>
   </p:sldIdLst>
   <p:sldSz cx="9144000" cy="5143500" type="screen16x9"/>
-  <p:notesSz cx="6858000" cy="9144000"/>
+  <p:notesSz cx="13258800" cy="23926800"/>
   <p:defaultTextStyle>
     <a:defPPr>
       <a:defRPr lang="de-DE"/>
@@ -164,6 +170,584 @@
 </p:presentation>
 </file>
 
+<file path=ppt/handoutMasters/handoutMaster1.xml><?xml version="1.0" encoding="utf-8"?>
+<p:handoutMaster xmlns:a="http://schemas.openxmlformats.org/drawingml/2006/main" xmlns:r="http://schemas.openxmlformats.org/officeDocument/2006/relationships" xmlns:p="http://schemas.openxmlformats.org/presentationml/2006/main">
+  <p:cSld>
+    <p:bg>
+      <p:bgRef idx="1001">
+        <a:schemeClr val="bg1"/>
+      </p:bgRef>
+    </p:bg>
+    <p:spTree>
+      <p:nvGrpSpPr>
+        <p:cNvPr id="1" name=""/>
+        <p:cNvGrpSpPr/>
+        <p:nvPr/>
+      </p:nvGrpSpPr>
+      <p:grpSpPr>
+        <a:xfrm>
+          <a:off x="0" y="0"/>
+          <a:ext cx="0" cy="0"/>
+          <a:chOff x="0" y="0"/>
+          <a:chExt cx="0" cy="0"/>
+        </a:xfrm>
+      </p:grpSpPr>
+      <p:sp>
+        <p:nvSpPr>
+          <p:cNvPr id="2" name="Header Placeholder 1"/>
+          <p:cNvSpPr>
+            <a:spLocks noGrp="1"/>
+          </p:cNvSpPr>
+          <p:nvPr>
+            <p:ph type="hdr" sz="quarter"/>
+          </p:nvPr>
+        </p:nvSpPr>
+        <p:spPr>
+          <a:xfrm>
+            <a:off x="0" y="0"/>
+            <a:ext cx="5745163" cy="1200150"/>
+          </a:xfrm>
+          <a:prstGeom prst="rect">
+            <a:avLst/>
+          </a:prstGeom>
+        </p:spPr>
+        <p:txBody>
+          <a:bodyPr vert="horz" lIns="91440" tIns="45720" rIns="91440" bIns="45720" rtlCol="0"/>
+          <a:lstStyle>
+            <a:lvl1pPr algn="l">
+              <a:defRPr sz="1200"/>
+            </a:lvl1pPr>
+          </a:lstStyle>
+          <a:p>
+            <a:endParaRPr lang="en-US"/>
+          </a:p>
+        </p:txBody>
+      </p:sp>
+      <p:sp>
+        <p:nvSpPr>
+          <p:cNvPr id="3" name="Date Placeholder 2"/>
+          <p:cNvSpPr>
+            <a:spLocks noGrp="1"/>
+          </p:cNvSpPr>
+          <p:nvPr>
+            <p:ph type="dt" sz="quarter" idx="1"/>
+          </p:nvPr>
+        </p:nvSpPr>
+        <p:spPr>
+          <a:xfrm>
+            <a:off x="7510463" y="0"/>
+            <a:ext cx="5745162" cy="1200150"/>
+          </a:xfrm>
+          <a:prstGeom prst="rect">
+            <a:avLst/>
+          </a:prstGeom>
+        </p:spPr>
+        <p:txBody>
+          <a:bodyPr vert="horz" lIns="91440" tIns="45720" rIns="91440" bIns="45720" rtlCol="0"/>
+          <a:lstStyle>
+            <a:lvl1pPr algn="r">
+              <a:defRPr sz="1200"/>
+            </a:lvl1pPr>
+          </a:lstStyle>
+          <a:p>
+            <a:fld id="{E6BAE45B-E87F-4948-B393-299E700CA214}" type="datetimeFigureOut">
+              <a:rPr lang="en-US" smtClean="0"/>
+              <a:t>2/8/2016</a:t>
+            </a:fld>
+            <a:endParaRPr lang="en-US"/>
+          </a:p>
+        </p:txBody>
+      </p:sp>
+      <p:sp>
+        <p:nvSpPr>
+          <p:cNvPr id="4" name="Footer Placeholder 3"/>
+          <p:cNvSpPr>
+            <a:spLocks noGrp="1"/>
+          </p:cNvSpPr>
+          <p:nvPr>
+            <p:ph type="ftr" sz="quarter" idx="2"/>
+          </p:nvPr>
+        </p:nvSpPr>
+        <p:spPr>
+          <a:xfrm>
+            <a:off x="0" y="22726650"/>
+            <a:ext cx="5745163" cy="1200150"/>
+          </a:xfrm>
+          <a:prstGeom prst="rect">
+            <a:avLst/>
+          </a:prstGeom>
+        </p:spPr>
+        <p:txBody>
+          <a:bodyPr vert="horz" lIns="91440" tIns="45720" rIns="91440" bIns="45720" rtlCol="0" anchor="b"/>
+          <a:lstStyle>
+            <a:lvl1pPr algn="l">
+              <a:defRPr sz="1200"/>
+            </a:lvl1pPr>
+          </a:lstStyle>
+          <a:p>
+            <a:endParaRPr lang="en-US"/>
+          </a:p>
+        </p:txBody>
+      </p:sp>
+      <p:sp>
+        <p:nvSpPr>
+          <p:cNvPr id="5" name="Slide Number Placeholder 4"/>
+          <p:cNvSpPr>
+            <a:spLocks noGrp="1"/>
+          </p:cNvSpPr>
+          <p:nvPr>
+            <p:ph type="sldNum" sz="quarter" idx="3"/>
+          </p:nvPr>
+        </p:nvSpPr>
+        <p:spPr>
+          <a:xfrm>
+            <a:off x="7510463" y="22726650"/>
+            <a:ext cx="5745162" cy="1200150"/>
+          </a:xfrm>
+          <a:prstGeom prst="rect">
+            <a:avLst/>
+          </a:prstGeom>
+        </p:spPr>
+        <p:txBody>
+          <a:bodyPr vert="horz" lIns="91440" tIns="45720" rIns="91440" bIns="45720" rtlCol="0" anchor="b"/>
+          <a:lstStyle>
+            <a:lvl1pPr algn="r">
+              <a:defRPr sz="1200"/>
+            </a:lvl1pPr>
+          </a:lstStyle>
+          <a:p>
+            <a:fld id="{72B75B01-A3C2-4ABF-A52F-B1C40E6FE4D1}" type="slidenum">
+              <a:rPr lang="en-US" smtClean="0"/>
+              <a:t>‹#›</a:t>
+            </a:fld>
+            <a:endParaRPr lang="en-US"/>
+          </a:p>
+        </p:txBody>
+      </p:sp>
+    </p:spTree>
+    <p:extLst>
+      <p:ext uri="{BB962C8B-B14F-4D97-AF65-F5344CB8AC3E}">
+        <p14:creationId xmlns:p14="http://schemas.microsoft.com/office/powerpoint/2010/main" val="2193536245"/>
+      </p:ext>
+    </p:extLst>
+  </p:cSld>
+  <p:clrMap bg1="lt1" tx1="dk1" bg2="lt2" tx2="dk2" accent1="accent1" accent2="accent2" accent3="accent3" accent4="accent4" accent5="accent5" accent6="accent6" hlink="hlink" folHlink="folHlink"/>
+  <p:hf sldNum="0" hdr="0" ftr="0" dt="0"/>
+</p:handoutMaster>
+</file>
+
+<file path=ppt/notesMasters/notesMaster1.xml><?xml version="1.0" encoding="utf-8"?>
+<p:notesMaster xmlns:a="http://schemas.openxmlformats.org/drawingml/2006/main" xmlns:r="http://schemas.openxmlformats.org/officeDocument/2006/relationships" xmlns:p="http://schemas.openxmlformats.org/presentationml/2006/main">
+  <p:cSld>
+    <p:bg>
+      <p:bgRef idx="1001">
+        <a:schemeClr val="bg1"/>
+      </p:bgRef>
+    </p:bg>
+    <p:spTree>
+      <p:nvGrpSpPr>
+        <p:cNvPr id="1" name=""/>
+        <p:cNvGrpSpPr/>
+        <p:nvPr/>
+      </p:nvGrpSpPr>
+      <p:grpSpPr>
+        <a:xfrm>
+          <a:off x="0" y="0"/>
+          <a:ext cx="0" cy="0"/>
+          <a:chOff x="0" y="0"/>
+          <a:chExt cx="0" cy="0"/>
+        </a:xfrm>
+      </p:grpSpPr>
+      <p:sp>
+        <p:nvSpPr>
+          <p:cNvPr id="2" name="Header Placeholder 1"/>
+          <p:cNvSpPr>
+            <a:spLocks noGrp="1"/>
+          </p:cNvSpPr>
+          <p:nvPr>
+            <p:ph type="hdr" sz="quarter"/>
+          </p:nvPr>
+        </p:nvSpPr>
+        <p:spPr>
+          <a:xfrm>
+            <a:off x="0" y="0"/>
+            <a:ext cx="5745163" cy="1200150"/>
+          </a:xfrm>
+          <a:prstGeom prst="rect">
+            <a:avLst/>
+          </a:prstGeom>
+        </p:spPr>
+        <p:txBody>
+          <a:bodyPr vert="horz" lIns="91440" tIns="45720" rIns="91440" bIns="45720" rtlCol="0"/>
+          <a:lstStyle>
+            <a:lvl1pPr algn="l">
+              <a:defRPr sz="1200"/>
+            </a:lvl1pPr>
+          </a:lstStyle>
+          <a:p>
+            <a:endParaRPr lang="en-US"/>
+          </a:p>
+        </p:txBody>
+      </p:sp>
+      <p:sp>
+        <p:nvSpPr>
+          <p:cNvPr id="3" name="Date Placeholder 2"/>
+          <p:cNvSpPr>
+            <a:spLocks noGrp="1"/>
+          </p:cNvSpPr>
+          <p:nvPr>
+            <p:ph type="dt" idx="1"/>
+          </p:nvPr>
+        </p:nvSpPr>
+        <p:spPr>
+          <a:xfrm>
+            <a:off x="7510463" y="0"/>
+            <a:ext cx="5745162" cy="1200150"/>
+          </a:xfrm>
+          <a:prstGeom prst="rect">
+            <a:avLst/>
+          </a:prstGeom>
+        </p:spPr>
+        <p:txBody>
+          <a:bodyPr vert="horz" lIns="91440" tIns="45720" rIns="91440" bIns="45720" rtlCol="0"/>
+          <a:lstStyle>
+            <a:lvl1pPr algn="r">
+              <a:defRPr sz="1200"/>
+            </a:lvl1pPr>
+          </a:lstStyle>
+          <a:p>
+            <a:fld id="{CEA0DD96-5CE1-48E6-A003-7CE9EF7C6F97}" type="datetimeFigureOut">
+              <a:rPr lang="en-US" smtClean="0"/>
+              <a:t>2/8/2016</a:t>
+            </a:fld>
+            <a:endParaRPr lang="en-US"/>
+          </a:p>
+        </p:txBody>
+      </p:sp>
+      <p:sp>
+        <p:nvSpPr>
+          <p:cNvPr id="4" name="Slide Image Placeholder 3"/>
+          <p:cNvSpPr>
+            <a:spLocks noGrp="1" noRot="1" noChangeAspect="1"/>
+          </p:cNvSpPr>
+          <p:nvPr>
+            <p:ph type="sldImg" idx="2"/>
+          </p:nvPr>
+        </p:nvSpPr>
+        <p:spPr>
+          <a:xfrm>
+            <a:off x="-547688" y="2990850"/>
+            <a:ext cx="14354176" cy="8075613"/>
+          </a:xfrm>
+          <a:prstGeom prst="rect">
+            <a:avLst/>
+          </a:prstGeom>
+          <a:noFill/>
+          <a:ln w="12700">
+            <a:solidFill>
+              <a:prstClr val="black"/>
+            </a:solidFill>
+          </a:ln>
+        </p:spPr>
+        <p:txBody>
+          <a:bodyPr vert="horz" lIns="91440" tIns="45720" rIns="91440" bIns="45720" rtlCol="0" anchor="ctr"/>
+          <a:lstStyle/>
+          <a:p>
+            <a:endParaRPr lang="en-US"/>
+          </a:p>
+        </p:txBody>
+      </p:sp>
+      <p:sp>
+        <p:nvSpPr>
+          <p:cNvPr id="5" name="Notes Placeholder 4"/>
+          <p:cNvSpPr>
+            <a:spLocks noGrp="1"/>
+          </p:cNvSpPr>
+          <p:nvPr>
+            <p:ph type="body" sz="quarter" idx="3"/>
+          </p:nvPr>
+        </p:nvSpPr>
+        <p:spPr>
+          <a:xfrm>
+            <a:off x="1325563" y="11514138"/>
+            <a:ext cx="10607675" cy="9421812"/>
+          </a:xfrm>
+          <a:prstGeom prst="rect">
+            <a:avLst/>
+          </a:prstGeom>
+        </p:spPr>
+        <p:txBody>
+          <a:bodyPr vert="horz" lIns="91440" tIns="45720" rIns="91440" bIns="45720" rtlCol="0"/>
+          <a:lstStyle/>
+          <a:p>
+            <a:pPr lvl="0"/>
+            <a:r>
+              <a:rPr lang="en-US" smtClean="0"/>
+              <a:t>Click to edit Master text styles</a:t>
+            </a:r>
+          </a:p>
+          <a:p>
+            <a:pPr lvl="1"/>
+            <a:r>
+              <a:rPr lang="en-US" smtClean="0"/>
+              <a:t>Second level</a:t>
+            </a:r>
+          </a:p>
+          <a:p>
+            <a:pPr lvl="2"/>
+            <a:r>
+              <a:rPr lang="en-US" smtClean="0"/>
+              <a:t>Third level</a:t>
+            </a:r>
+          </a:p>
+          <a:p>
+            <a:pPr lvl="3"/>
+            <a:r>
+              <a:rPr lang="en-US" smtClean="0"/>
+              <a:t>Fourth level</a:t>
+            </a:r>
+          </a:p>
+          <a:p>
+            <a:pPr lvl="4"/>
+            <a:r>
+              <a:rPr lang="en-US" smtClean="0"/>
+              <a:t>Fifth level</a:t>
+            </a:r>
+            <a:endParaRPr lang="en-US"/>
+          </a:p>
+        </p:txBody>
+      </p:sp>
+      <p:sp>
+        <p:nvSpPr>
+          <p:cNvPr id="6" name="Footer Placeholder 5"/>
+          <p:cNvSpPr>
+            <a:spLocks noGrp="1"/>
+          </p:cNvSpPr>
+          <p:nvPr>
+            <p:ph type="ftr" sz="quarter" idx="4"/>
+          </p:nvPr>
+        </p:nvSpPr>
+        <p:spPr>
+          <a:xfrm>
+            <a:off x="0" y="22726650"/>
+            <a:ext cx="5745163" cy="1200150"/>
+          </a:xfrm>
+          <a:prstGeom prst="rect">
+            <a:avLst/>
+          </a:prstGeom>
+        </p:spPr>
+        <p:txBody>
+          <a:bodyPr vert="horz" lIns="91440" tIns="45720" rIns="91440" bIns="45720" rtlCol="0" anchor="b"/>
+          <a:lstStyle>
+            <a:lvl1pPr algn="l">
+              <a:defRPr sz="1200"/>
+            </a:lvl1pPr>
+          </a:lstStyle>
+          <a:p>
+            <a:endParaRPr lang="en-US"/>
+          </a:p>
+        </p:txBody>
+      </p:sp>
+      <p:sp>
+        <p:nvSpPr>
+          <p:cNvPr id="7" name="Slide Number Placeholder 6"/>
+          <p:cNvSpPr>
+            <a:spLocks noGrp="1"/>
+          </p:cNvSpPr>
+          <p:nvPr>
+            <p:ph type="sldNum" sz="quarter" idx="5"/>
+          </p:nvPr>
+        </p:nvSpPr>
+        <p:spPr>
+          <a:xfrm>
+            <a:off x="7510463" y="22726650"/>
+            <a:ext cx="5745162" cy="1200150"/>
+          </a:xfrm>
+          <a:prstGeom prst="rect">
+            <a:avLst/>
+          </a:prstGeom>
+        </p:spPr>
+        <p:txBody>
+          <a:bodyPr vert="horz" lIns="91440" tIns="45720" rIns="91440" bIns="45720" rtlCol="0" anchor="b"/>
+          <a:lstStyle>
+            <a:lvl1pPr algn="r">
+              <a:defRPr sz="1200"/>
+            </a:lvl1pPr>
+          </a:lstStyle>
+          <a:p>
+            <a:fld id="{76939971-DC89-4BF9-A980-755334D66F7B}" type="slidenum">
+              <a:rPr lang="en-US" smtClean="0"/>
+              <a:t>‹#›</a:t>
+            </a:fld>
+            <a:endParaRPr lang="en-US"/>
+          </a:p>
+        </p:txBody>
+      </p:sp>
+    </p:spTree>
+    <p:extLst>
+      <p:ext uri="{BB962C8B-B14F-4D97-AF65-F5344CB8AC3E}">
+        <p14:creationId xmlns:p14="http://schemas.microsoft.com/office/powerpoint/2010/main" val="4000285009"/>
+      </p:ext>
+    </p:extLst>
+  </p:cSld>
+  <p:clrMap bg1="lt1" tx1="dk1" bg2="lt2" tx2="dk2" accent1="accent1" accent2="accent2" accent3="accent3" accent4="accent4" accent5="accent5" accent6="accent6" hlink="hlink" folHlink="folHlink"/>
+  <p:hf sldNum="0" hdr="0" ftr="0" dt="0"/>
+  <p:notesStyle>
+    <a:lvl1pPr marL="0" algn="l" defTabSz="914400" rtl="0" eaLnBrk="1" latinLnBrk="0" hangingPunct="1">
+      <a:defRPr sz="1200" kern="1200">
+        <a:solidFill>
+          <a:schemeClr val="tx1"/>
+        </a:solidFill>
+        <a:latin typeface="+mn-lt"/>
+        <a:ea typeface="+mn-ea"/>
+        <a:cs typeface="+mn-cs"/>
+      </a:defRPr>
+    </a:lvl1pPr>
+    <a:lvl2pPr marL="457200" algn="l" defTabSz="914400" rtl="0" eaLnBrk="1" latinLnBrk="0" hangingPunct="1">
+      <a:defRPr sz="1200" kern="1200">
+        <a:solidFill>
+          <a:schemeClr val="tx1"/>
+        </a:solidFill>
+        <a:latin typeface="+mn-lt"/>
+        <a:ea typeface="+mn-ea"/>
+        <a:cs typeface="+mn-cs"/>
+      </a:defRPr>
+    </a:lvl2pPr>
+    <a:lvl3pPr marL="914400" algn="l" defTabSz="914400" rtl="0" eaLnBrk="1" latinLnBrk="0" hangingPunct="1">
+      <a:defRPr sz="1200" kern="1200">
+        <a:solidFill>
+          <a:schemeClr val="tx1"/>
+        </a:solidFill>
+        <a:latin typeface="+mn-lt"/>
+        <a:ea typeface="+mn-ea"/>
+        <a:cs typeface="+mn-cs"/>
+      </a:defRPr>
+    </a:lvl3pPr>
+    <a:lvl4pPr marL="1371600" algn="l" defTabSz="914400" rtl="0" eaLnBrk="1" latinLnBrk="0" hangingPunct="1">
+      <a:defRPr sz="1200" kern="1200">
+        <a:solidFill>
+          <a:schemeClr val="tx1"/>
+        </a:solidFill>
+        <a:latin typeface="+mn-lt"/>
+        <a:ea typeface="+mn-ea"/>
+        <a:cs typeface="+mn-cs"/>
+      </a:defRPr>
+    </a:lvl4pPr>
+    <a:lvl5pPr marL="1828800" algn="l" defTabSz="914400" rtl="0" eaLnBrk="1" latinLnBrk="0" hangingPunct="1">
+      <a:defRPr sz="1200" kern="1200">
+        <a:solidFill>
+          <a:schemeClr val="tx1"/>
+        </a:solidFill>
+        <a:latin typeface="+mn-lt"/>
+        <a:ea typeface="+mn-ea"/>
+        <a:cs typeface="+mn-cs"/>
+      </a:defRPr>
+    </a:lvl5pPr>
+    <a:lvl6pPr marL="2286000" algn="l" defTabSz="914400" rtl="0" eaLnBrk="1" latinLnBrk="0" hangingPunct="1">
+      <a:defRPr sz="1200" kern="1200">
+        <a:solidFill>
+          <a:schemeClr val="tx1"/>
+        </a:solidFill>
+        <a:latin typeface="+mn-lt"/>
+        <a:ea typeface="+mn-ea"/>
+        <a:cs typeface="+mn-cs"/>
+      </a:defRPr>
+    </a:lvl6pPr>
+    <a:lvl7pPr marL="2743200" algn="l" defTabSz="914400" rtl="0" eaLnBrk="1" latinLnBrk="0" hangingPunct="1">
+      <a:defRPr sz="1200" kern="1200">
+        <a:solidFill>
+          <a:schemeClr val="tx1"/>
+        </a:solidFill>
+        <a:latin typeface="+mn-lt"/>
+        <a:ea typeface="+mn-ea"/>
+        <a:cs typeface="+mn-cs"/>
+      </a:defRPr>
+    </a:lvl7pPr>
+    <a:lvl8pPr marL="3200400" algn="l" defTabSz="914400" rtl="0" eaLnBrk="1" latinLnBrk="0" hangingPunct="1">
+      <a:defRPr sz="1200" kern="1200">
+        <a:solidFill>
+          <a:schemeClr val="tx1"/>
+        </a:solidFill>
+        <a:latin typeface="+mn-lt"/>
+        <a:ea typeface="+mn-ea"/>
+        <a:cs typeface="+mn-cs"/>
+      </a:defRPr>
+    </a:lvl8pPr>
+    <a:lvl9pPr marL="3657600" algn="l" defTabSz="914400" rtl="0" eaLnBrk="1" latinLnBrk="0" hangingPunct="1">
+      <a:defRPr sz="1200" kern="1200">
+        <a:solidFill>
+          <a:schemeClr val="tx1"/>
+        </a:solidFill>
+        <a:latin typeface="+mn-lt"/>
+        <a:ea typeface="+mn-ea"/>
+        <a:cs typeface="+mn-cs"/>
+      </a:defRPr>
+    </a:lvl9pPr>
+  </p:notesStyle>
+</p:notesMaster>
+</file>
+
+<file path=ppt/notesSlides/notesSlide1.xml><?xml version="1.0" encoding="utf-8"?>
+<p:notes xmlns:a="http://schemas.openxmlformats.org/drawingml/2006/main" xmlns:r="http://schemas.openxmlformats.org/officeDocument/2006/relationships" xmlns:p="http://schemas.openxmlformats.org/presentationml/2006/main">
+  <p:cSld>
+    <p:spTree>
+      <p:nvGrpSpPr>
+        <p:cNvPr id="1" name=""/>
+        <p:cNvGrpSpPr/>
+        <p:nvPr/>
+      </p:nvGrpSpPr>
+      <p:grpSpPr>
+        <a:xfrm>
+          <a:off x="0" y="0"/>
+          <a:ext cx="0" cy="0"/>
+          <a:chOff x="0" y="0"/>
+          <a:chExt cx="0" cy="0"/>
+        </a:xfrm>
+      </p:grpSpPr>
+      <p:sp>
+        <p:nvSpPr>
+          <p:cNvPr id="2" name="Slide Image Placeholder 1"/>
+          <p:cNvSpPr>
+            <a:spLocks noGrp="1" noRot="1" noChangeAspect="1"/>
+          </p:cNvSpPr>
+          <p:nvPr>
+            <p:ph type="sldImg"/>
+          </p:nvPr>
+        </p:nvSpPr>
+        <p:spPr/>
+      </p:sp>
+      <p:sp>
+        <p:nvSpPr>
+          <p:cNvPr id="3" name="Notes Placeholder 2"/>
+          <p:cNvSpPr>
+            <a:spLocks noGrp="1"/>
+          </p:cNvSpPr>
+          <p:nvPr>
+            <p:ph type="body" idx="1"/>
+          </p:nvPr>
+        </p:nvSpPr>
+        <p:spPr/>
+        <p:txBody>
+          <a:bodyPr/>
+          <a:lstStyle/>
+          <a:p>
+            <a:endParaRPr lang="en-US"/>
+          </a:p>
+        </p:txBody>
+      </p:sp>
+    </p:spTree>
+    <p:extLst>
+      <p:ext uri="{BB962C8B-B14F-4D97-AF65-F5344CB8AC3E}">
+        <p14:creationId xmlns:p14="http://schemas.microsoft.com/office/powerpoint/2010/main" val="2251392711"/>
+      </p:ext>
+    </p:extLst>
+  </p:cSld>
+  <p:clrMapOvr>
+    <a:masterClrMapping/>
+  </p:clrMapOvr>
+</p:notes>
+</file>
+
 <file path=ppt/slideLayouts/slideLayout1.xml><?xml version="1.0" encoding="utf-8"?>
 <p:sldLayout xmlns:a="http://schemas.openxmlformats.org/drawingml/2006/main" xmlns:r="http://schemas.openxmlformats.org/officeDocument/2006/relationships" xmlns:p="http://schemas.openxmlformats.org/presentationml/2006/main" type="title" preserve="1">
   <p:cSld name="Title Slide">
@@ -295,7 +879,7 @@
           <a:p>
             <a:fld id="{AF1194EC-C915-441E-AD9A-616349DBA75B}" type="datetimeFigureOut">
               <a:rPr lang="en-US" smtClean="0"/>
-              <a:t>2/7/2016</a:t>
+              <a:t>2/8/2016</a:t>
             </a:fld>
             <a:endParaRPr lang="en-US"/>
           </a:p>
@@ -465,7 +1049,7 @@
           <a:p>
             <a:fld id="{AF1194EC-C915-441E-AD9A-616349DBA75B}" type="datetimeFigureOut">
               <a:rPr lang="en-US" smtClean="0"/>
-              <a:t>2/7/2016</a:t>
+              <a:t>2/8/2016</a:t>
             </a:fld>
             <a:endParaRPr lang="en-US"/>
           </a:p>
@@ -645,7 +1229,7 @@
           <a:p>
             <a:fld id="{AF1194EC-C915-441E-AD9A-616349DBA75B}" type="datetimeFigureOut">
               <a:rPr lang="en-US" smtClean="0"/>
-              <a:t>2/7/2016</a:t>
+              <a:t>2/8/2016</a:t>
             </a:fld>
             <a:endParaRPr lang="en-US"/>
           </a:p>
@@ -815,7 +1399,7 @@
           <a:p>
             <a:fld id="{AF1194EC-C915-441E-AD9A-616349DBA75B}" type="datetimeFigureOut">
               <a:rPr lang="en-US" smtClean="0"/>
-              <a:t>2/7/2016</a:t>
+              <a:t>2/8/2016</a:t>
             </a:fld>
             <a:endParaRPr lang="en-US"/>
           </a:p>
@@ -1061,7 +1645,7 @@
           <a:p>
             <a:fld id="{AF1194EC-C915-441E-AD9A-616349DBA75B}" type="datetimeFigureOut">
               <a:rPr lang="en-US" smtClean="0"/>
-              <a:t>2/7/2016</a:t>
+              <a:t>2/8/2016</a:t>
             </a:fld>
             <a:endParaRPr lang="en-US"/>
           </a:p>
@@ -1293,7 +1877,7 @@
           <a:p>
             <a:fld id="{AF1194EC-C915-441E-AD9A-616349DBA75B}" type="datetimeFigureOut">
               <a:rPr lang="en-US" smtClean="0"/>
-              <a:t>2/7/2016</a:t>
+              <a:t>2/8/2016</a:t>
             </a:fld>
             <a:endParaRPr lang="en-US"/>
           </a:p>
@@ -1660,7 +2244,7 @@
           <a:p>
             <a:fld id="{AF1194EC-C915-441E-AD9A-616349DBA75B}" type="datetimeFigureOut">
               <a:rPr lang="en-US" smtClean="0"/>
-              <a:t>2/7/2016</a:t>
+              <a:t>2/8/2016</a:t>
             </a:fld>
             <a:endParaRPr lang="en-US"/>
           </a:p>
@@ -1778,7 +2362,7 @@
           <a:p>
             <a:fld id="{AF1194EC-C915-441E-AD9A-616349DBA75B}" type="datetimeFigureOut">
               <a:rPr lang="en-US" smtClean="0"/>
-              <a:t>2/7/2016</a:t>
+              <a:t>2/8/2016</a:t>
             </a:fld>
             <a:endParaRPr lang="en-US"/>
           </a:p>
@@ -1873,7 +2457,7 @@
           <a:p>
             <a:fld id="{AF1194EC-C915-441E-AD9A-616349DBA75B}" type="datetimeFigureOut">
               <a:rPr lang="en-US" smtClean="0"/>
-              <a:t>2/7/2016</a:t>
+              <a:t>2/8/2016</a:t>
             </a:fld>
             <a:endParaRPr lang="en-US"/>
           </a:p>
@@ -2150,7 +2734,7 @@
           <a:p>
             <a:fld id="{AF1194EC-C915-441E-AD9A-616349DBA75B}" type="datetimeFigureOut">
               <a:rPr lang="en-US" smtClean="0"/>
-              <a:t>2/7/2016</a:t>
+              <a:t>2/8/2016</a:t>
             </a:fld>
             <a:endParaRPr lang="en-US"/>
           </a:p>
@@ -2403,7 +2987,7 @@
           <a:p>
             <a:fld id="{AF1194EC-C915-441E-AD9A-616349DBA75B}" type="datetimeFigureOut">
               <a:rPr lang="en-US" smtClean="0"/>
-              <a:t>2/7/2016</a:t>
+              <a:t>2/8/2016</a:t>
             </a:fld>
             <a:endParaRPr lang="en-US"/>
           </a:p>
@@ -2622,7 +3206,7 @@
           <a:p>
             <a:fld id="{AF1194EC-C915-441E-AD9A-616349DBA75B}" type="datetimeFigureOut">
               <a:rPr lang="en-US" smtClean="0"/>
-              <a:t>2/7/2016</a:t>
+              <a:t>2/8/2016</a:t>
             </a:fld>
             <a:endParaRPr lang="en-US"/>
           </a:p>
@@ -4439,7 +5023,7 @@
     <p:bg>
       <p:bgPr>
         <a:blipFill dpi="0" rotWithShape="1">
-          <a:blip r:embed="rId2">
+          <a:blip r:embed="rId3">
             <a:lum/>
           </a:blip>
           <a:srcRect/>
@@ -4687,7 +5271,7 @@
           <p:nvPr/>
         </p:nvPicPr>
         <p:blipFill>
-          <a:blip r:link="rId3"/>
+          <a:blip r:link="rId4"/>
           <a:stretch>
             <a:fillRect/>
           </a:stretch>
@@ -6083,6 +6667,67 @@
           </a:p>
         </p:txBody>
       </p:sp>
+      <p:sp>
+        <p:nvSpPr>
+          <p:cNvPr id="15" name="Textfeld 4"/>
+          <p:cNvSpPr txBox="1"/>
+          <p:nvPr/>
+        </p:nvSpPr>
+        <p:spPr>
+          <a:xfrm>
+            <a:off x="2225675" y="896292"/>
+            <a:ext cx="3407870" cy="578882"/>
+          </a:xfrm>
+          <a:prstGeom prst="roundRect">
+            <a:avLst/>
+          </a:prstGeom>
+          <a:solidFill>
+            <a:srgbClr val="5B9BD5"/>
+          </a:solidFill>
+          <a:effectLst>
+            <a:outerShdw blurRad="50800" dist="114300" dir="8100000" algn="tr" rotWithShape="0">
+              <a:prstClr val="black">
+                <a:alpha val="40000"/>
+              </a:prstClr>
+            </a:outerShdw>
+          </a:effectLst>
+        </p:spPr>
+        <p:txBody>
+          <a:bodyPr wrap="square" rtlCol="0">
+            <a:spAutoFit/>
+          </a:bodyPr>
+          <a:lstStyle/>
+          <a:p>
+            <a:r>
+              <a:rPr lang="de-DE" sz="2800" dirty="0" smtClean="0">
+                <a:latin typeface="Gabriola" panose="04040605051002020D02" pitchFamily="82" charset="0"/>
+              </a:rPr>
+              <a:t>Create Sets </a:t>
+            </a:r>
+            <a:r>
+              <a:rPr lang="de-DE" sz="2800" dirty="0" err="1" smtClean="0">
+                <a:latin typeface="Gabriola" panose="04040605051002020D02" pitchFamily="82" charset="0"/>
+              </a:rPr>
+              <a:t>and</a:t>
+            </a:r>
+            <a:r>
+              <a:rPr lang="de-DE" sz="2800" dirty="0" smtClean="0">
+                <a:latin typeface="Gabriola" panose="04040605051002020D02" pitchFamily="82" charset="0"/>
+              </a:rPr>
+              <a:t> </a:t>
+            </a:r>
+            <a:r>
+              <a:rPr lang="de-DE" sz="2800" dirty="0" err="1" smtClean="0">
+                <a:latin typeface="Gabriola" panose="04040605051002020D02" pitchFamily="82" charset="0"/>
+              </a:rPr>
+              <a:t>Contributors</a:t>
+            </a:r>
+            <a:endParaRPr lang="en-US" sz="2800" dirty="0">
+              <a:latin typeface="Gabriola" panose="04040605051002020D02" pitchFamily="82" charset="0"/>
+            </a:endParaRPr>
+          </a:p>
+        </p:txBody>
+      </p:sp>
       <p:pic>
         <p:nvPicPr>
           <p:cNvPr id="11" name="Grafik 5"/>
@@ -6307,67 +6952,6 @@
               <a:t>cases</a:t>
             </a:r>
             <a:endParaRPr lang="de-DE" sz="1600" dirty="0">
-              <a:latin typeface="Gabriola" panose="04040605051002020D02" pitchFamily="82" charset="0"/>
-            </a:endParaRPr>
-          </a:p>
-        </p:txBody>
-      </p:sp>
-      <p:sp>
-        <p:nvSpPr>
-          <p:cNvPr id="15" name="Textfeld 4"/>
-          <p:cNvSpPr txBox="1"/>
-          <p:nvPr/>
-        </p:nvSpPr>
-        <p:spPr>
-          <a:xfrm>
-            <a:off x="2225675" y="896292"/>
-            <a:ext cx="3407870" cy="578882"/>
-          </a:xfrm>
-          <a:prstGeom prst="roundRect">
-            <a:avLst/>
-          </a:prstGeom>
-          <a:solidFill>
-            <a:srgbClr val="5B9BD5"/>
-          </a:solidFill>
-          <a:effectLst>
-            <a:outerShdw blurRad="50800" dist="114300" dir="8100000" algn="tr" rotWithShape="0">
-              <a:prstClr val="black">
-                <a:alpha val="40000"/>
-              </a:prstClr>
-            </a:outerShdw>
-          </a:effectLst>
-        </p:spPr>
-        <p:txBody>
-          <a:bodyPr wrap="square" rtlCol="0">
-            <a:spAutoFit/>
-          </a:bodyPr>
-          <a:lstStyle/>
-          <a:p>
-            <a:r>
-              <a:rPr lang="de-DE" sz="2800" dirty="0" smtClean="0">
-                <a:latin typeface="Gabriola" panose="04040605051002020D02" pitchFamily="82" charset="0"/>
-              </a:rPr>
-              <a:t>Create Sets </a:t>
-            </a:r>
-            <a:r>
-              <a:rPr lang="de-DE" sz="2800" dirty="0" err="1" smtClean="0">
-                <a:latin typeface="Gabriola" panose="04040605051002020D02" pitchFamily="82" charset="0"/>
-              </a:rPr>
-              <a:t>and</a:t>
-            </a:r>
-            <a:r>
-              <a:rPr lang="de-DE" sz="2800" dirty="0" smtClean="0">
-                <a:latin typeface="Gabriola" panose="04040605051002020D02" pitchFamily="82" charset="0"/>
-              </a:rPr>
-              <a:t> </a:t>
-            </a:r>
-            <a:r>
-              <a:rPr lang="de-DE" sz="2800" dirty="0" err="1" smtClean="0">
-                <a:latin typeface="Gabriola" panose="04040605051002020D02" pitchFamily="82" charset="0"/>
-              </a:rPr>
-              <a:t>Contributors</a:t>
-            </a:r>
-            <a:endParaRPr lang="en-US" sz="2800" dirty="0">
               <a:latin typeface="Gabriola" panose="04040605051002020D02" pitchFamily="82" charset="0"/>
             </a:endParaRPr>
           </a:p>
@@ -7420,6 +8004,56 @@
       </p:grpSpPr>
       <p:sp>
         <p:nvSpPr>
+          <p:cNvPr id="2" name="Rectangle 1"/>
+          <p:cNvSpPr/>
+          <p:nvPr/>
+        </p:nvSpPr>
+        <p:spPr>
+          <a:xfrm>
+            <a:off x="1510018" y="2824163"/>
+            <a:ext cx="6123964" cy="406893"/>
+          </a:xfrm>
+          <a:prstGeom prst="rect">
+            <a:avLst/>
+          </a:prstGeom>
+          <a:solidFill>
+            <a:schemeClr val="bg1"/>
+          </a:solidFill>
+          <a:ln>
+            <a:solidFill>
+              <a:schemeClr val="bg1">
+                <a:lumMod val="65000"/>
+              </a:schemeClr>
+            </a:solidFill>
+          </a:ln>
+        </p:spPr>
+        <p:style>
+          <a:lnRef idx="2">
+            <a:schemeClr val="accent1">
+              <a:shade val="50000"/>
+            </a:schemeClr>
+          </a:lnRef>
+          <a:fillRef idx="1">
+            <a:schemeClr val="accent1"/>
+          </a:fillRef>
+          <a:effectRef idx="0">
+            <a:schemeClr val="accent1"/>
+          </a:effectRef>
+          <a:fontRef idx="minor">
+            <a:schemeClr val="lt1"/>
+          </a:fontRef>
+        </p:style>
+        <p:txBody>
+          <a:bodyPr rtlCol="0" anchor="ctr"/>
+          <a:lstStyle/>
+          <a:p>
+            <a:pPr algn="ctr"/>
+            <a:endParaRPr lang="en-US"/>
+          </a:p>
+        </p:txBody>
+      </p:sp>
+      <p:sp>
+        <p:nvSpPr>
           <p:cNvPr id="18" name="Textfeld 17"/>
           <p:cNvSpPr txBox="1"/>
           <p:nvPr/>
@@ -7467,31 +8101,21 @@
         </p:nvPicPr>
         <p:blipFill rotWithShape="1">
           <a:blip r:link="rId2"/>
-          <a:srcRect l="1996" t="15319" r="3993" b="79078"/>
+          <a:srcRect l="1996" t="15904" r="3993" b="80358"/>
           <a:stretch/>
         </p:blipFill>
         <p:spPr>
           <a:xfrm>
-            <a:off x="1588172" y="2873704"/>
-            <a:ext cx="5967657" cy="357352"/>
+            <a:off x="1588171" y="2908417"/>
+            <a:ext cx="5967657" cy="238384"/>
           </a:xfrm>
           <a:prstGeom prst="rect">
             <a:avLst/>
           </a:prstGeom>
           <a:ln>
-            <a:solidFill>
-              <a:schemeClr val="bg1">
-                <a:lumMod val="75000"/>
-              </a:schemeClr>
-            </a:solidFill>
+            <a:noFill/>
           </a:ln>
-          <a:effectLst>
-            <a:outerShdw blurRad="50800" dist="38100" dir="8100000" algn="tr" rotWithShape="0">
-              <a:prstClr val="black">
-                <a:alpha val="40000"/>
-              </a:prstClr>
-            </a:outerShdw>
-          </a:effectLst>
+          <a:effectLst/>
         </p:spPr>
       </p:pic>
     </p:spTree>
@@ -12505,39 +13129,26 @@
       </p:grpSpPr>
       <p:pic>
         <p:nvPicPr>
-          <p:cNvPr id="2" name="Picture 1"/>
+          <p:cNvPr id="3" name="Picture 2"/>
           <p:cNvPicPr>
             <a:picLocks noChangeAspect="1"/>
           </p:cNvPicPr>
           <p:nvPr/>
         </p:nvPicPr>
         <p:blipFill>
-          <a:blip r:embed="rId2">
-            <a:extLst>
-              <a:ext uri="{28A0092B-C50C-407E-A947-70E740481C1C}">
-                <a14:useLocalDpi xmlns:a14="http://schemas.microsoft.com/office/drawing/2010/main" val="0"/>
-              </a:ext>
-            </a:extLst>
-          </a:blip>
+          <a:blip r:link="rId2"/>
           <a:stretch>
             <a:fillRect/>
           </a:stretch>
         </p:blipFill>
         <p:spPr>
           <a:xfrm>
-            <a:off x="2645911" y="1542225"/>
+            <a:off x="2654300" y="1299750"/>
             <a:ext cx="3835400" cy="2544000"/>
           </a:xfrm>
           <a:prstGeom prst="rect">
             <a:avLst/>
           </a:prstGeom>
-          <a:ln>
-            <a:solidFill>
-              <a:schemeClr val="bg1">
-                <a:lumMod val="75000"/>
-              </a:schemeClr>
-            </a:solidFill>
-          </a:ln>
         </p:spPr>
       </p:pic>
       <p:sp>
@@ -12636,7 +13247,7 @@
         </p:nvCxnSpPr>
         <p:spPr>
           <a:xfrm>
-            <a:off x="3227898" y="2468695"/>
+            <a:off x="3227898" y="2214695"/>
             <a:ext cx="1327324" cy="0"/>
           </a:xfrm>
           <a:prstGeom prst="line">
@@ -12977,79 +13588,94 @@
           </a:effectLst>
         </p:spPr>
       </p:pic>
-      <p:pic>
-        <p:nvPicPr>
-          <p:cNvPr id="6" name="Picture 5"/>
-          <p:cNvPicPr>
-            <a:picLocks noChangeAspect="1"/>
-          </p:cNvPicPr>
-          <p:nvPr/>
-        </p:nvPicPr>
-        <p:blipFill>
-          <a:blip r:link="rId4"/>
-          <a:stretch>
-            <a:fillRect/>
-          </a:stretch>
-        </p:blipFill>
-        <p:spPr>
-          <a:xfrm>
-            <a:off x="3677077" y="1434801"/>
+      <p:grpSp>
+        <p:nvGrpSpPr>
+          <p:cNvPr id="2" name="Group 1"/>
+          <p:cNvGrpSpPr/>
+          <p:nvPr/>
+        </p:nvGrpSpPr>
+        <p:grpSpPr>
+          <a:xfrm>
+            <a:off x="217243" y="808840"/>
             <a:ext cx="3745646" cy="1404519"/>
-          </a:xfrm>
-          <a:prstGeom prst="rect">
-            <a:avLst/>
-          </a:prstGeom>
-          <a:ln>
-            <a:solidFill>
-              <a:schemeClr val="bg1">
-                <a:lumMod val="75000"/>
-              </a:schemeClr>
-            </a:solidFill>
-          </a:ln>
-          <a:effectLst>
-            <a:outerShdw blurRad="457200" dist="1295400" dir="9120000" sx="94000" sy="94000" algn="tr" rotWithShape="0">
-              <a:prstClr val="black">
-                <a:alpha val="41000"/>
-              </a:prstClr>
-            </a:outerShdw>
-          </a:effectLst>
-        </p:spPr>
-      </p:pic>
-      <p:cxnSp>
-        <p:nvCxnSpPr>
-          <p:cNvPr id="9" name="Straight Connector 11"/>
-          <p:cNvCxnSpPr/>
-          <p:nvPr/>
-        </p:nvCxnSpPr>
-        <p:spPr>
-          <a:xfrm>
-            <a:off x="3971278" y="1541812"/>
-            <a:ext cx="927833" cy="0"/>
-          </a:xfrm>
-          <a:prstGeom prst="line">
-            <a:avLst/>
-          </a:prstGeom>
-          <a:ln w="57150">
-            <a:solidFill>
-              <a:srgbClr val="00B050"/>
-            </a:solidFill>
-          </a:ln>
-        </p:spPr>
-        <p:style>
-          <a:lnRef idx="1">
-            <a:schemeClr val="accent1"/>
-          </a:lnRef>
-          <a:fillRef idx="0">
-            <a:schemeClr val="accent1"/>
-          </a:fillRef>
-          <a:effectRef idx="0">
-            <a:schemeClr val="accent1"/>
-          </a:effectRef>
-          <a:fontRef idx="minor">
-            <a:schemeClr val="tx1"/>
-          </a:fontRef>
-        </p:style>
-      </p:cxnSp>
+            <a:chOff x="225632" y="2924503"/>
+            <a:chExt cx="3745646" cy="1404519"/>
+          </a:xfrm>
+        </p:grpSpPr>
+        <p:pic>
+          <p:nvPicPr>
+            <p:cNvPr id="6" name="Picture 5"/>
+            <p:cNvPicPr>
+              <a:picLocks noChangeAspect="1"/>
+            </p:cNvPicPr>
+            <p:nvPr/>
+          </p:nvPicPr>
+          <p:blipFill>
+            <a:blip r:link="rId4"/>
+            <a:stretch>
+              <a:fillRect/>
+            </a:stretch>
+          </p:blipFill>
+          <p:spPr>
+            <a:xfrm>
+              <a:off x="225632" y="2924503"/>
+              <a:ext cx="3745646" cy="1404519"/>
+            </a:xfrm>
+            <a:prstGeom prst="rect">
+              <a:avLst/>
+            </a:prstGeom>
+            <a:ln>
+              <a:solidFill>
+                <a:schemeClr val="bg1">
+                  <a:lumMod val="75000"/>
+                </a:schemeClr>
+              </a:solidFill>
+            </a:ln>
+            <a:effectLst>
+              <a:outerShdw blurRad="457200" dist="1295400" dir="9120000" sx="94000" sy="94000" algn="tr" rotWithShape="0">
+                <a:prstClr val="black">
+                  <a:alpha val="41000"/>
+                </a:prstClr>
+              </a:outerShdw>
+            </a:effectLst>
+          </p:spPr>
+        </p:pic>
+        <p:cxnSp>
+          <p:nvCxnSpPr>
+            <p:cNvPr id="9" name="Straight Connector 11"/>
+            <p:cNvCxnSpPr/>
+            <p:nvPr/>
+          </p:nvCxnSpPr>
+          <p:spPr>
+            <a:xfrm>
+              <a:off x="531791" y="3076998"/>
+              <a:ext cx="927833" cy="0"/>
+            </a:xfrm>
+            <a:prstGeom prst="line">
+              <a:avLst/>
+            </a:prstGeom>
+            <a:ln w="57150">
+              <a:solidFill>
+                <a:srgbClr val="00B050"/>
+              </a:solidFill>
+            </a:ln>
+          </p:spPr>
+          <p:style>
+            <a:lnRef idx="1">
+              <a:schemeClr val="accent1"/>
+            </a:lnRef>
+            <a:fillRef idx="0">
+              <a:schemeClr val="accent1"/>
+            </a:fillRef>
+            <a:effectRef idx="0">
+              <a:schemeClr val="accent1"/>
+            </a:effectRef>
+            <a:fontRef idx="minor">
+              <a:schemeClr val="tx1"/>
+            </a:fontRef>
+          </p:style>
+        </p:cxnSp>
+      </p:grpSp>
       <p:cxnSp>
         <p:nvCxnSpPr>
           <p:cNvPr id="13" name="Straight Connector 11"/>
@@ -13533,8 +14159,8 @@
         </p:nvSpPr>
         <p:spPr>
           <a:xfrm>
-            <a:off x="1912884" y="1282431"/>
-            <a:ext cx="5801709" cy="3416320"/>
+            <a:off x="1912884" y="901431"/>
+            <a:ext cx="5801709" cy="4616648"/>
           </a:xfrm>
           <a:prstGeom prst="rect">
             <a:avLst/>
@@ -13552,49 +14178,63 @@
               <a:buChar char="-"/>
             </a:pPr>
             <a:r>
-              <a:rPr lang="de-DE" sz="2800" dirty="0" smtClean="0">
-                <a:latin typeface="Gabriola" panose="04040605051002020D02" pitchFamily="82" charset="0"/>
-                <a:sym typeface="Wingdings" panose="05000000000000000000" pitchFamily="2" charset="2"/>
-              </a:rPr>
-              <a:t>Recording </a:t>
-            </a:r>
-            <a:r>
-              <a:rPr lang="de-DE" sz="2800" dirty="0" err="1" smtClean="0">
+              <a:rPr lang="de-DE" sz="2400" dirty="0" smtClean="0">
+                <a:latin typeface="Gabriola" panose="04040605051002020D02" pitchFamily="82" charset="0"/>
+                <a:sym typeface="Wingdings" panose="05000000000000000000" pitchFamily="2" charset="2"/>
+              </a:rPr>
+              <a:t>Support </a:t>
+            </a:r>
+            <a:r>
+              <a:rPr lang="de-DE" sz="2400" dirty="0" err="1" smtClean="0">
+                <a:latin typeface="Gabriola" panose="04040605051002020D02" pitchFamily="82" charset="0"/>
+                <a:sym typeface="Wingdings" panose="05000000000000000000" pitchFamily="2" charset="2"/>
+              </a:rPr>
+              <a:t>recording</a:t>
+            </a:r>
+            <a:r>
+              <a:rPr lang="de-DE" sz="2400" dirty="0" smtClean="0">
+                <a:latin typeface="Gabriola" panose="04040605051002020D02" pitchFamily="82" charset="0"/>
+                <a:sym typeface="Wingdings" panose="05000000000000000000" pitchFamily="2" charset="2"/>
+              </a:rPr>
+              <a:t> </a:t>
+            </a:r>
+            <a:r>
+              <a:rPr lang="de-DE" sz="2400" dirty="0" err="1" smtClean="0">
                 <a:latin typeface="Gabriola" panose="04040605051002020D02" pitchFamily="82" charset="0"/>
                 <a:sym typeface="Wingdings" panose="05000000000000000000" pitchFamily="2" charset="2"/>
               </a:rPr>
               <a:t>of</a:t>
             </a:r>
             <a:r>
-              <a:rPr lang="de-DE" sz="2800" dirty="0" smtClean="0">
+              <a:rPr lang="de-DE" sz="2400" dirty="0" smtClean="0">
                 <a:latin typeface="Gabriola" panose="04040605051002020D02" pitchFamily="82" charset="0"/>
                 <a:sym typeface="Wingdings" panose="05000000000000000000" pitchFamily="2" charset="2"/>
               </a:rPr>
               <a:t> </a:t>
             </a:r>
             <a:r>
-              <a:rPr lang="de-DE" sz="2800" dirty="0" err="1" smtClean="0">
+              <a:rPr lang="de-DE" sz="2400" dirty="0" err="1" smtClean="0">
                 <a:latin typeface="Gabriola" panose="04040605051002020D02" pitchFamily="82" charset="0"/>
                 <a:sym typeface="Wingdings" panose="05000000000000000000" pitchFamily="2" charset="2"/>
               </a:rPr>
               <a:t>method</a:t>
             </a:r>
             <a:r>
-              <a:rPr lang="de-DE" sz="2800" dirty="0" smtClean="0">
+              <a:rPr lang="de-DE" sz="2400" dirty="0" smtClean="0">
                 <a:latin typeface="Gabriola" panose="04040605051002020D02" pitchFamily="82" charset="0"/>
                 <a:sym typeface="Wingdings" panose="05000000000000000000" pitchFamily="2" charset="2"/>
               </a:rPr>
               <a:t> </a:t>
             </a:r>
             <a:r>
-              <a:rPr lang="de-DE" sz="2800" dirty="0" err="1" smtClean="0">
+              <a:rPr lang="de-DE" sz="2400" dirty="0" err="1" smtClean="0">
                 <a:latin typeface="Gabriola" panose="04040605051002020D02" pitchFamily="82" charset="0"/>
                 <a:sym typeface="Wingdings" panose="05000000000000000000" pitchFamily="2" charset="2"/>
               </a:rPr>
               <a:t>calls</a:t>
             </a:r>
             <a:r>
-              <a:rPr lang="de-DE" sz="2800" dirty="0" smtClean="0">
+              <a:rPr lang="de-DE" sz="2400" dirty="0" smtClean="0">
                 <a:latin typeface="Gabriola" panose="04040605051002020D02" pitchFamily="82" charset="0"/>
                 <a:sym typeface="Wingdings" panose="05000000000000000000" pitchFamily="2" charset="2"/>
               </a:rPr>
@@ -13604,91 +14244,91 @@
           <a:p>
             <a:pPr lvl="1"/>
             <a:r>
-              <a:rPr lang="de-DE" sz="2000" dirty="0" smtClean="0">
+              <a:rPr lang="de-DE" sz="1800" dirty="0" smtClean="0">
                 <a:latin typeface="Gabriola" panose="04040605051002020D02" pitchFamily="82" charset="0"/>
                 <a:sym typeface="Wingdings" panose="05000000000000000000" pitchFamily="2" charset="2"/>
               </a:rPr>
               <a:t>(</a:t>
             </a:r>
             <a:r>
-              <a:rPr lang="de-DE" sz="2000" dirty="0" err="1" smtClean="0">
+              <a:rPr lang="de-DE" sz="1800" dirty="0" err="1" smtClean="0">
                 <a:latin typeface="Gabriola" panose="04040605051002020D02" pitchFamily="82" charset="0"/>
                 <a:sym typeface="Wingdings" panose="05000000000000000000" pitchFamily="2" charset="2"/>
               </a:rPr>
               <a:t>currently</a:t>
             </a:r>
             <a:r>
-              <a:rPr lang="de-DE" sz="2000" dirty="0" smtClean="0">
+              <a:rPr lang="de-DE" sz="1800" dirty="0" smtClean="0">
                 <a:latin typeface="Gabriola" panose="04040605051002020D02" pitchFamily="82" charset="0"/>
                 <a:sym typeface="Wingdings" panose="05000000000000000000" pitchFamily="2" charset="2"/>
               </a:rPr>
               <a:t> </a:t>
             </a:r>
             <a:r>
-              <a:rPr lang="de-DE" sz="2000" dirty="0" err="1" smtClean="0">
+              <a:rPr lang="de-DE" sz="1800" dirty="0" err="1" smtClean="0">
                 <a:latin typeface="Gabriola" panose="04040605051002020D02" pitchFamily="82" charset="0"/>
                 <a:sym typeface="Wingdings" panose="05000000000000000000" pitchFamily="2" charset="2"/>
               </a:rPr>
               <a:t>only</a:t>
             </a:r>
             <a:r>
-              <a:rPr lang="de-DE" sz="2000" dirty="0" smtClean="0">
+              <a:rPr lang="de-DE" sz="1800" dirty="0" smtClean="0">
                 <a:latin typeface="Gabriola" panose="04040605051002020D02" pitchFamily="82" charset="0"/>
                 <a:sym typeface="Wingdings" panose="05000000000000000000" pitchFamily="2" charset="2"/>
               </a:rPr>
               <a:t> </a:t>
             </a:r>
             <a:r>
-              <a:rPr lang="de-DE" sz="2000" dirty="0" err="1" smtClean="0">
+              <a:rPr lang="de-DE" sz="1800" dirty="0" err="1" smtClean="0">
                 <a:latin typeface="Gabriola" panose="04040605051002020D02" pitchFamily="82" charset="0"/>
                 <a:sym typeface="Wingdings" panose="05000000000000000000" pitchFamily="2" charset="2"/>
               </a:rPr>
               <a:t>property</a:t>
             </a:r>
             <a:r>
-              <a:rPr lang="de-DE" sz="2000" dirty="0" smtClean="0">
+              <a:rPr lang="de-DE" sz="1800" dirty="0" smtClean="0">
                 <a:latin typeface="Gabriola" panose="04040605051002020D02" pitchFamily="82" charset="0"/>
                 <a:sym typeface="Wingdings" panose="05000000000000000000" pitchFamily="2" charset="2"/>
               </a:rPr>
               <a:t> </a:t>
             </a:r>
             <a:r>
-              <a:rPr lang="de-DE" sz="2000" dirty="0" err="1" smtClean="0">
+              <a:rPr lang="de-DE" sz="1800" dirty="0" err="1" smtClean="0">
                 <a:latin typeface="Gabriola" panose="04040605051002020D02" pitchFamily="82" charset="0"/>
                 <a:sym typeface="Wingdings" panose="05000000000000000000" pitchFamily="2" charset="2"/>
               </a:rPr>
               <a:t>calls</a:t>
             </a:r>
             <a:r>
-              <a:rPr lang="de-DE" sz="2000" dirty="0" smtClean="0">
+              <a:rPr lang="de-DE" sz="1800" dirty="0" smtClean="0">
                 <a:latin typeface="Gabriola" panose="04040605051002020D02" pitchFamily="82" charset="0"/>
                 <a:sym typeface="Wingdings" panose="05000000000000000000" pitchFamily="2" charset="2"/>
               </a:rPr>
               <a:t> </a:t>
             </a:r>
             <a:r>
-              <a:rPr lang="de-DE" sz="2000" dirty="0" err="1" smtClean="0">
+              <a:rPr lang="de-DE" sz="1800" dirty="0" err="1" smtClean="0">
                 <a:latin typeface="Gabriola" panose="04040605051002020D02" pitchFamily="82" charset="0"/>
                 <a:sym typeface="Wingdings" panose="05000000000000000000" pitchFamily="2" charset="2"/>
               </a:rPr>
               <a:t>are</a:t>
             </a:r>
             <a:r>
-              <a:rPr lang="de-DE" sz="2000" dirty="0" smtClean="0">
+              <a:rPr lang="de-DE" sz="1800" dirty="0" smtClean="0">
                 <a:latin typeface="Gabriola" panose="04040605051002020D02" pitchFamily="82" charset="0"/>
                 <a:sym typeface="Wingdings" panose="05000000000000000000" pitchFamily="2" charset="2"/>
               </a:rPr>
               <a:t> </a:t>
             </a:r>
             <a:r>
-              <a:rPr lang="de-DE" sz="2000" dirty="0" err="1" smtClean="0">
+              <a:rPr lang="de-DE" sz="1800" dirty="0" err="1" smtClean="0">
                 <a:latin typeface="Gabriola" panose="04040605051002020D02" pitchFamily="82" charset="0"/>
                 <a:sym typeface="Wingdings" panose="05000000000000000000" pitchFamily="2" charset="2"/>
               </a:rPr>
               <a:t>recorded</a:t>
             </a:r>
             <a:r>
-              <a:rPr lang="de-DE" sz="2000" dirty="0" smtClean="0">
+              <a:rPr lang="de-DE" sz="1800" dirty="0" smtClean="0">
                 <a:latin typeface="Gabriola" panose="04040605051002020D02" pitchFamily="82" charset="0"/>
                 <a:sym typeface="Wingdings" panose="05000000000000000000" pitchFamily="2" charset="2"/>
               </a:rPr>
@@ -13696,11 +14336,8 @@
             </a:r>
           </a:p>
           <a:p>
-            <a:pPr marL="685800" lvl="1" indent="-342900">
-              <a:buFontTx/>
-              <a:buChar char="-"/>
-            </a:pPr>
-            <a:endParaRPr lang="de-DE" sz="2800" dirty="0" smtClean="0">
+            <a:pPr lvl="1"/>
+            <a:endParaRPr lang="de-DE" sz="1600" dirty="0" smtClean="0">
               <a:latin typeface="Gabriola" panose="04040605051002020D02" pitchFamily="82" charset="0"/>
               <a:sym typeface="Wingdings" panose="05000000000000000000" pitchFamily="2" charset="2"/>
             </a:endParaRPr>
@@ -13711,54 +14348,198 @@
               <a:buChar char="-"/>
             </a:pPr>
             <a:r>
-              <a:rPr lang="de-DE" sz="2800" dirty="0" err="1" smtClean="0">
-                <a:latin typeface="Gabriola" panose="04040605051002020D02" pitchFamily="82" charset="0"/>
-                <a:sym typeface="Wingdings" panose="05000000000000000000" pitchFamily="2" charset="2"/>
-              </a:rPr>
-              <a:t>Moq</a:t>
-            </a:r>
-            <a:r>
-              <a:rPr lang="de-DE" sz="2800" dirty="0" smtClean="0">
-                <a:latin typeface="Gabriola" panose="04040605051002020D02" pitchFamily="82" charset="0"/>
-                <a:sym typeface="Wingdings" panose="05000000000000000000" pitchFamily="2" charset="2"/>
-              </a:rPr>
-              <a:t> like Setup(…) </a:t>
-            </a:r>
-            <a:r>
-              <a:rPr lang="de-DE" sz="2800" dirty="0" err="1" smtClean="0">
-                <a:latin typeface="Gabriola" panose="04040605051002020D02" pitchFamily="82" charset="0"/>
-                <a:sym typeface="Wingdings" panose="05000000000000000000" pitchFamily="2" charset="2"/>
-              </a:rPr>
-              <a:t>and</a:t>
-            </a:r>
-            <a:r>
-              <a:rPr lang="de-DE" sz="2800" dirty="0" smtClean="0">
+              <a:rPr lang="de-DE" sz="2400" dirty="0" smtClean="0">
+                <a:latin typeface="Gabriola" panose="04040605051002020D02" pitchFamily="82" charset="0"/>
+                <a:sym typeface="Wingdings" panose="05000000000000000000" pitchFamily="2" charset="2"/>
+              </a:rPr>
+              <a:t>Support </a:t>
+            </a:r>
+            <a:r>
+              <a:rPr lang="de-DE" sz="2400" dirty="0" err="1" smtClean="0">
+                <a:latin typeface="Gabriola" panose="04040605051002020D02" pitchFamily="82" charset="0"/>
+                <a:sym typeface="Wingdings" panose="05000000000000000000" pitchFamily="2" charset="2"/>
+              </a:rPr>
+              <a:t>class</a:t>
+            </a:r>
+            <a:r>
+              <a:rPr lang="de-DE" sz="2400" dirty="0" smtClean="0">
                 <a:latin typeface="Gabriola" panose="04040605051002020D02" pitchFamily="82" charset="0"/>
                 <a:sym typeface="Wingdings" panose="05000000000000000000" pitchFamily="2" charset="2"/>
               </a:rPr>
               <a:t> </a:t>
             </a:r>
             <a:r>
-              <a:rPr lang="de-DE" sz="2800" dirty="0" err="1" smtClean="0">
-                <a:latin typeface="Gabriola" panose="04040605051002020D02" pitchFamily="82" charset="0"/>
-                <a:sym typeface="Wingdings" panose="05000000000000000000" pitchFamily="2" charset="2"/>
-              </a:rPr>
-              <a:t>Verify</a:t>
-            </a:r>
-            <a:r>
-              <a:rPr lang="de-DE" sz="2800" dirty="0" smtClean="0">
-                <a:latin typeface="Gabriola" panose="04040605051002020D02" pitchFamily="82" charset="0"/>
-                <a:sym typeface="Wingdings" panose="05000000000000000000" pitchFamily="2" charset="2"/>
-              </a:rPr>
-              <a:t>(…)</a:t>
-            </a:r>
+              <a:rPr lang="de-DE" sz="2400" dirty="0" err="1" smtClean="0">
+                <a:latin typeface="Gabriola" panose="04040605051002020D02" pitchFamily="82" charset="0"/>
+                <a:sym typeface="Wingdings" panose="05000000000000000000" pitchFamily="2" charset="2"/>
+              </a:rPr>
+              <a:t>contributors</a:t>
+            </a:r>
+            <a:r>
+              <a:rPr lang="de-DE" sz="2400" dirty="0" smtClean="0">
+                <a:latin typeface="Gabriola" panose="04040605051002020D02" pitchFamily="82" charset="0"/>
+                <a:sym typeface="Wingdings" panose="05000000000000000000" pitchFamily="2" charset="2"/>
+              </a:rPr>
+              <a:t/>
+            </a:r>
+            <a:br>
+              <a:rPr lang="de-DE" sz="2400" dirty="0" smtClean="0">
+                <a:latin typeface="Gabriola" panose="04040605051002020D02" pitchFamily="82" charset="0"/>
+                <a:sym typeface="Wingdings" panose="05000000000000000000" pitchFamily="2" charset="2"/>
+              </a:rPr>
+            </a:br>
+            <a:r>
+              <a:rPr lang="de-DE" sz="1800" dirty="0" smtClean="0">
+                <a:latin typeface="Gabriola" panose="04040605051002020D02" pitchFamily="82" charset="0"/>
+                <a:sym typeface="Wingdings" panose="05000000000000000000" pitchFamily="2" charset="2"/>
+              </a:rPr>
+              <a:t>(</a:t>
+            </a:r>
+            <a:r>
+              <a:rPr lang="de-DE" sz="1800" dirty="0" err="1" smtClean="0">
+                <a:latin typeface="Gabriola" panose="04040605051002020D02" pitchFamily="82" charset="0"/>
+                <a:sym typeface="Wingdings" panose="05000000000000000000" pitchFamily="2" charset="2"/>
+              </a:rPr>
+              <a:t>currently</a:t>
+            </a:r>
+            <a:r>
+              <a:rPr lang="de-DE" sz="1800" dirty="0" smtClean="0">
+                <a:latin typeface="Gabriola" panose="04040605051002020D02" pitchFamily="82" charset="0"/>
+                <a:sym typeface="Wingdings" panose="05000000000000000000" pitchFamily="2" charset="2"/>
+              </a:rPr>
+              <a:t> </a:t>
+            </a:r>
+            <a:r>
+              <a:rPr lang="de-DE" sz="1800" dirty="0" err="1" smtClean="0">
+                <a:latin typeface="Gabriola" panose="04040605051002020D02" pitchFamily="82" charset="0"/>
+                <a:sym typeface="Wingdings" panose="05000000000000000000" pitchFamily="2" charset="2"/>
+              </a:rPr>
+              <a:t>only</a:t>
+            </a:r>
+            <a:r>
+              <a:rPr lang="de-DE" sz="1800" dirty="0" smtClean="0">
+                <a:latin typeface="Gabriola" panose="04040605051002020D02" pitchFamily="82" charset="0"/>
+                <a:sym typeface="Wingdings" panose="05000000000000000000" pitchFamily="2" charset="2"/>
+              </a:rPr>
+              <a:t> </a:t>
+            </a:r>
+            <a:r>
+              <a:rPr lang="de-DE" sz="1800" dirty="0" err="1" smtClean="0">
+                <a:latin typeface="Gabriola" panose="04040605051002020D02" pitchFamily="82" charset="0"/>
+                <a:sym typeface="Wingdings" panose="05000000000000000000" pitchFamily="2" charset="2"/>
+              </a:rPr>
+              <a:t>interface</a:t>
+            </a:r>
+            <a:r>
+              <a:rPr lang="de-DE" sz="1800" dirty="0" smtClean="0">
+                <a:latin typeface="Gabriola" panose="04040605051002020D02" pitchFamily="82" charset="0"/>
+                <a:sym typeface="Wingdings" panose="05000000000000000000" pitchFamily="2" charset="2"/>
+              </a:rPr>
+              <a:t> </a:t>
+            </a:r>
+            <a:r>
+              <a:rPr lang="de-DE" sz="1800" dirty="0" err="1" smtClean="0">
+                <a:latin typeface="Gabriola" panose="04040605051002020D02" pitchFamily="82" charset="0"/>
+                <a:sym typeface="Wingdings" panose="05000000000000000000" pitchFamily="2" charset="2"/>
+              </a:rPr>
+              <a:t>contributors</a:t>
+            </a:r>
+            <a:r>
+              <a:rPr lang="de-DE" sz="1800" dirty="0" smtClean="0">
+                <a:latin typeface="Gabriola" panose="04040605051002020D02" pitchFamily="82" charset="0"/>
+                <a:sym typeface="Wingdings" panose="05000000000000000000" pitchFamily="2" charset="2"/>
+              </a:rPr>
+              <a:t> </a:t>
+            </a:r>
+            <a:r>
+              <a:rPr lang="de-DE" sz="1800" dirty="0" err="1" smtClean="0">
+                <a:latin typeface="Gabriola" panose="04040605051002020D02" pitchFamily="82" charset="0"/>
+                <a:sym typeface="Wingdings" panose="05000000000000000000" pitchFamily="2" charset="2"/>
+              </a:rPr>
+              <a:t>are</a:t>
+            </a:r>
+            <a:r>
+              <a:rPr lang="de-DE" sz="1800" dirty="0" smtClean="0">
+                <a:latin typeface="Gabriola" panose="04040605051002020D02" pitchFamily="82" charset="0"/>
+                <a:sym typeface="Wingdings" panose="05000000000000000000" pitchFamily="2" charset="2"/>
+              </a:rPr>
+              <a:t> </a:t>
+            </a:r>
+            <a:r>
+              <a:rPr lang="de-DE" sz="1800" dirty="0" err="1" smtClean="0">
+                <a:latin typeface="Gabriola" panose="04040605051002020D02" pitchFamily="82" charset="0"/>
+                <a:sym typeface="Wingdings" panose="05000000000000000000" pitchFamily="2" charset="2"/>
+              </a:rPr>
+              <a:t>supported</a:t>
+            </a:r>
+            <a:r>
+              <a:rPr lang="de-DE" sz="1800" dirty="0" smtClean="0">
+                <a:latin typeface="Gabriola" panose="04040605051002020D02" pitchFamily="82" charset="0"/>
+                <a:sym typeface="Wingdings" panose="05000000000000000000" pitchFamily="2" charset="2"/>
+              </a:rPr>
+              <a:t>)</a:t>
+            </a:r>
+            <a:endParaRPr lang="de-DE" sz="1800" dirty="0" smtClean="0">
+              <a:latin typeface="Gabriola" panose="04040605051002020D02" pitchFamily="82" charset="0"/>
+              <a:sym typeface="Wingdings" panose="05000000000000000000" pitchFamily="2" charset="2"/>
+            </a:endParaRPr>
+          </a:p>
+          <a:p>
+            <a:endParaRPr lang="de-DE" sz="1600" dirty="0" smtClean="0">
+              <a:latin typeface="Gabriola" panose="04040605051002020D02" pitchFamily="82" charset="0"/>
+              <a:sym typeface="Wingdings" panose="05000000000000000000" pitchFamily="2" charset="2"/>
+            </a:endParaRPr>
           </a:p>
           <a:p>
             <a:pPr marL="342900" indent="-342900">
               <a:buFontTx/>
               <a:buChar char="-"/>
             </a:pPr>
-            <a:endParaRPr lang="de-DE" sz="2800" dirty="0" smtClean="0">
+            <a:r>
+              <a:rPr lang="de-DE" sz="2400" dirty="0" err="1" smtClean="0">
+                <a:latin typeface="Gabriola" panose="04040605051002020D02" pitchFamily="82" charset="0"/>
+                <a:sym typeface="Wingdings" panose="05000000000000000000" pitchFamily="2" charset="2"/>
+              </a:rPr>
+              <a:t>Moq</a:t>
+            </a:r>
+            <a:r>
+              <a:rPr lang="de-DE" sz="2400" dirty="0" smtClean="0">
+                <a:latin typeface="Gabriola" panose="04040605051002020D02" pitchFamily="82" charset="0"/>
+                <a:sym typeface="Wingdings" panose="05000000000000000000" pitchFamily="2" charset="2"/>
+              </a:rPr>
+              <a:t> like Setup(…) </a:t>
+            </a:r>
+            <a:r>
+              <a:rPr lang="de-DE" sz="2400" dirty="0" err="1" smtClean="0">
+                <a:latin typeface="Gabriola" panose="04040605051002020D02" pitchFamily="82" charset="0"/>
+                <a:sym typeface="Wingdings" panose="05000000000000000000" pitchFamily="2" charset="2"/>
+              </a:rPr>
+              <a:t>and</a:t>
+            </a:r>
+            <a:r>
+              <a:rPr lang="de-DE" sz="2400" dirty="0" smtClean="0">
+                <a:latin typeface="Gabriola" panose="04040605051002020D02" pitchFamily="82" charset="0"/>
+                <a:sym typeface="Wingdings" panose="05000000000000000000" pitchFamily="2" charset="2"/>
+              </a:rPr>
+              <a:t> </a:t>
+            </a:r>
+            <a:r>
+              <a:rPr lang="de-DE" sz="2400" dirty="0" err="1" smtClean="0">
+                <a:latin typeface="Gabriola" panose="04040605051002020D02" pitchFamily="82" charset="0"/>
+                <a:sym typeface="Wingdings" panose="05000000000000000000" pitchFamily="2" charset="2"/>
+              </a:rPr>
+              <a:t>Verify</a:t>
+            </a:r>
+            <a:r>
+              <a:rPr lang="de-DE" sz="2400" dirty="0" smtClean="0">
+                <a:latin typeface="Gabriola" panose="04040605051002020D02" pitchFamily="82" charset="0"/>
+                <a:sym typeface="Wingdings" panose="05000000000000000000" pitchFamily="2" charset="2"/>
+              </a:rPr>
+              <a:t>(…)</a:t>
+            </a:r>
+          </a:p>
+          <a:p>
+            <a:endParaRPr lang="de-DE" sz="1600" dirty="0" smtClean="0">
               <a:latin typeface="Gabriola" panose="04040605051002020D02" pitchFamily="82" charset="0"/>
               <a:sym typeface="Wingdings" panose="05000000000000000000" pitchFamily="2" charset="2"/>
             </a:endParaRPr>
@@ -13769,68 +14550,385 @@
               <a:buChar char="-"/>
             </a:pPr>
             <a:r>
-              <a:rPr lang="de-DE" sz="2800" dirty="0" smtClean="0">
+              <a:rPr lang="de-DE" sz="2400" dirty="0" smtClean="0">
                 <a:latin typeface="Gabriola" panose="04040605051002020D02" pitchFamily="82" charset="0"/>
                 <a:sym typeface="Wingdings" panose="05000000000000000000" pitchFamily="2" charset="2"/>
               </a:rPr>
               <a:t>Permutation Set</a:t>
             </a:r>
             <a:br>
-              <a:rPr lang="de-DE" sz="2800" dirty="0" smtClean="0">
+              <a:rPr lang="de-DE" sz="2400" dirty="0" smtClean="0">
                 <a:latin typeface="Gabriola" panose="04040605051002020D02" pitchFamily="82" charset="0"/>
                 <a:sym typeface="Wingdings" panose="05000000000000000000" pitchFamily="2" charset="2"/>
               </a:rPr>
             </a:br>
             <a:r>
-              <a:rPr lang="de-DE" sz="2000" dirty="0" err="1" smtClean="0">
+              <a:rPr lang="de-DE" sz="1800" dirty="0" err="1" smtClean="0">
                 <a:latin typeface="Gabriola" panose="04040605051002020D02" pitchFamily="82" charset="0"/>
                 <a:sym typeface="Wingdings" panose="05000000000000000000" pitchFamily="2" charset="2"/>
               </a:rPr>
               <a:t>permuting</a:t>
             </a:r>
             <a:r>
-              <a:rPr lang="de-DE" sz="2000" dirty="0" smtClean="0">
+              <a:rPr lang="de-DE" sz="1800" dirty="0" smtClean="0">
                 <a:latin typeface="Gabriola" panose="04040605051002020D02" pitchFamily="82" charset="0"/>
                 <a:sym typeface="Wingdings" panose="05000000000000000000" pitchFamily="2" charset="2"/>
               </a:rPr>
               <a:t> </a:t>
             </a:r>
             <a:r>
-              <a:rPr lang="de-DE" sz="2000" dirty="0" err="1" smtClean="0">
+              <a:rPr lang="de-DE" sz="1800" dirty="0" err="1" smtClean="0">
                 <a:latin typeface="Gabriola" panose="04040605051002020D02" pitchFamily="82" charset="0"/>
                 <a:sym typeface="Wingdings" panose="05000000000000000000" pitchFamily="2" charset="2"/>
               </a:rPr>
               <a:t>order</a:t>
             </a:r>
             <a:r>
-              <a:rPr lang="de-DE" sz="2000" dirty="0" smtClean="0">
+              <a:rPr lang="de-DE" sz="1800" dirty="0" smtClean="0">
                 <a:latin typeface="Gabriola" panose="04040605051002020D02" pitchFamily="82" charset="0"/>
                 <a:sym typeface="Wingdings" panose="05000000000000000000" pitchFamily="2" charset="2"/>
               </a:rPr>
               <a:t> </a:t>
             </a:r>
             <a:r>
-              <a:rPr lang="de-DE" sz="2000" dirty="0" err="1" smtClean="0">
+              <a:rPr lang="de-DE" sz="1800" dirty="0" err="1" smtClean="0">
                 <a:latin typeface="Gabriola" panose="04040605051002020D02" pitchFamily="82" charset="0"/>
                 <a:sym typeface="Wingdings" panose="05000000000000000000" pitchFamily="2" charset="2"/>
               </a:rPr>
               <a:t>of</a:t>
             </a:r>
             <a:r>
-              <a:rPr lang="de-DE" sz="2000" dirty="0" smtClean="0">
+              <a:rPr lang="de-DE" sz="1800" dirty="0" smtClean="0">
                 <a:latin typeface="Gabriola" panose="04040605051002020D02" pitchFamily="82" charset="0"/>
                 <a:sym typeface="Wingdings" panose="05000000000000000000" pitchFamily="2" charset="2"/>
               </a:rPr>
               <a:t> </a:t>
             </a:r>
             <a:r>
-              <a:rPr lang="de-DE" sz="2000" dirty="0" err="1" smtClean="0">
+              <a:rPr lang="de-DE" sz="1800" dirty="0" err="1">
                 <a:latin typeface="Gabriola" panose="04040605051002020D02" pitchFamily="82" charset="0"/>
                 <a:sym typeface="Wingdings" panose="05000000000000000000" pitchFamily="2" charset="2"/>
               </a:rPr>
               <a:t>calls</a:t>
             </a:r>
-            <a:endParaRPr lang="de-DE" sz="2800" dirty="0" smtClean="0">
+            <a:endParaRPr lang="de-DE" sz="1800" dirty="0">
+              <a:latin typeface="Gabriola" panose="04040605051002020D02" pitchFamily="82" charset="0"/>
+              <a:sym typeface="Wingdings" panose="05000000000000000000" pitchFamily="2" charset="2"/>
+            </a:endParaRPr>
+          </a:p>
+          <a:p>
+            <a:endParaRPr lang="de-DE" sz="1200" dirty="0">
+              <a:latin typeface="Gabriola" panose="04040605051002020D02" pitchFamily="82" charset="0"/>
+              <a:sym typeface="Wingdings" panose="05000000000000000000" pitchFamily="2" charset="2"/>
+            </a:endParaRPr>
+          </a:p>
+          <a:p>
+            <a:pPr marL="342900" lvl="0" indent="-342900">
+              <a:buFontTx/>
+              <a:buChar char="-"/>
+            </a:pPr>
+            <a:r>
+              <a:rPr lang="de-DE" sz="2400" dirty="0" err="1" smtClean="0">
+                <a:latin typeface="Gabriola" panose="04040605051002020D02" pitchFamily="82" charset="0"/>
+                <a:sym typeface="Wingdings" panose="05000000000000000000" pitchFamily="2" charset="2"/>
+              </a:rPr>
+              <a:t>Dedicated</a:t>
+            </a:r>
+            <a:r>
+              <a:rPr lang="de-DE" sz="2400" dirty="0" smtClean="0">
+                <a:latin typeface="Gabriola" panose="04040605051002020D02" pitchFamily="82" charset="0"/>
+                <a:sym typeface="Wingdings" panose="05000000000000000000" pitchFamily="2" charset="2"/>
+              </a:rPr>
+              <a:t> </a:t>
+            </a:r>
+            <a:r>
+              <a:rPr lang="de-DE" sz="2400" dirty="0" err="1" smtClean="0">
+                <a:latin typeface="Gabriola" panose="04040605051002020D02" pitchFamily="82" charset="0"/>
+                <a:sym typeface="Wingdings" panose="05000000000000000000" pitchFamily="2" charset="2"/>
+              </a:rPr>
+              <a:t>unit</a:t>
+            </a:r>
+            <a:r>
+              <a:rPr lang="de-DE" sz="2400" dirty="0" smtClean="0">
+                <a:latin typeface="Gabriola" panose="04040605051002020D02" pitchFamily="82" charset="0"/>
+                <a:sym typeface="Wingdings" panose="05000000000000000000" pitchFamily="2" charset="2"/>
+              </a:rPr>
+              <a:t> </a:t>
+            </a:r>
+            <a:r>
+              <a:rPr lang="de-DE" sz="2400" dirty="0" err="1" smtClean="0">
+                <a:latin typeface="Gabriola" panose="04040605051002020D02" pitchFamily="82" charset="0"/>
+                <a:sym typeface="Wingdings" panose="05000000000000000000" pitchFamily="2" charset="2"/>
+              </a:rPr>
+              <a:t>test</a:t>
+            </a:r>
+            <a:r>
+              <a:rPr lang="de-DE" sz="2400" dirty="0" smtClean="0">
+                <a:latin typeface="Gabriola" panose="04040605051002020D02" pitchFamily="82" charset="0"/>
+                <a:sym typeface="Wingdings" panose="05000000000000000000" pitchFamily="2" charset="2"/>
+              </a:rPr>
+              <a:t> </a:t>
+            </a:r>
+            <a:r>
+              <a:rPr lang="de-DE" sz="2400" dirty="0" err="1" smtClean="0">
+                <a:latin typeface="Gabriola" panose="04040605051002020D02" pitchFamily="82" charset="0"/>
+                <a:sym typeface="Wingdings" panose="05000000000000000000" pitchFamily="2" charset="2"/>
+              </a:rPr>
+              <a:t>runner</a:t>
+            </a:r>
+            <a:r>
+              <a:rPr lang="de-DE" sz="2400" dirty="0">
+                <a:solidFill>
+                  <a:prstClr val="black"/>
+                </a:solidFill>
+                <a:latin typeface="Gabriola" panose="04040605051002020D02" pitchFamily="82" charset="0"/>
+                <a:sym typeface="Wingdings" panose="05000000000000000000" pitchFamily="2" charset="2"/>
+              </a:rPr>
+              <a:t/>
+            </a:r>
+            <a:br>
+              <a:rPr lang="de-DE" sz="2400" dirty="0">
+                <a:solidFill>
+                  <a:prstClr val="black"/>
+                </a:solidFill>
+                <a:latin typeface="Gabriola" panose="04040605051002020D02" pitchFamily="82" charset="0"/>
+                <a:sym typeface="Wingdings" panose="05000000000000000000" pitchFamily="2" charset="2"/>
+              </a:rPr>
+            </a:br>
+            <a:r>
+              <a:rPr lang="de-DE" sz="1800" dirty="0" err="1" smtClean="0">
+                <a:solidFill>
+                  <a:prstClr val="black"/>
+                </a:solidFill>
+                <a:latin typeface="Gabriola" panose="04040605051002020D02" pitchFamily="82" charset="0"/>
+                <a:sym typeface="Wingdings" panose="05000000000000000000" pitchFamily="2" charset="2"/>
+              </a:rPr>
+              <a:t>currently</a:t>
+            </a:r>
+            <a:r>
+              <a:rPr lang="de-DE" sz="1800" dirty="0" smtClean="0">
+                <a:solidFill>
+                  <a:prstClr val="black"/>
+                </a:solidFill>
+                <a:latin typeface="Gabriola" panose="04040605051002020D02" pitchFamily="82" charset="0"/>
+                <a:sym typeface="Wingdings" panose="05000000000000000000" pitchFamily="2" charset="2"/>
+              </a:rPr>
+              <a:t> </a:t>
+            </a:r>
+            <a:r>
+              <a:rPr lang="de-DE" sz="1800" dirty="0" err="1" smtClean="0">
+                <a:solidFill>
+                  <a:prstClr val="black"/>
+                </a:solidFill>
+                <a:latin typeface="Gabriola" panose="04040605051002020D02" pitchFamily="82" charset="0"/>
+                <a:sym typeface="Wingdings" panose="05000000000000000000" pitchFamily="2" charset="2"/>
+              </a:rPr>
+              <a:t>integrates</a:t>
+            </a:r>
+            <a:r>
+              <a:rPr lang="de-DE" sz="1800" dirty="0" smtClean="0">
+                <a:solidFill>
+                  <a:prstClr val="black"/>
+                </a:solidFill>
+                <a:latin typeface="Gabriola" panose="04040605051002020D02" pitchFamily="82" charset="0"/>
+                <a:sym typeface="Wingdings" panose="05000000000000000000" pitchFamily="2" charset="2"/>
+              </a:rPr>
+              <a:t> </a:t>
+            </a:r>
+            <a:r>
+              <a:rPr lang="de-DE" sz="1800" dirty="0" err="1" smtClean="0">
+                <a:solidFill>
+                  <a:prstClr val="black"/>
+                </a:solidFill>
+                <a:latin typeface="Gabriola" panose="04040605051002020D02" pitchFamily="82" charset="0"/>
+                <a:sym typeface="Wingdings" panose="05000000000000000000" pitchFamily="2" charset="2"/>
+              </a:rPr>
+              <a:t>with</a:t>
+            </a:r>
+            <a:r>
+              <a:rPr lang="de-DE" sz="1800" dirty="0" smtClean="0">
+                <a:solidFill>
+                  <a:prstClr val="black"/>
+                </a:solidFill>
+                <a:latin typeface="Gabriola" panose="04040605051002020D02" pitchFamily="82" charset="0"/>
+                <a:sym typeface="Wingdings" panose="05000000000000000000" pitchFamily="2" charset="2"/>
+              </a:rPr>
+              <a:t> </a:t>
+            </a:r>
+            <a:r>
+              <a:rPr lang="de-DE" sz="1800" dirty="0" err="1" smtClean="0">
+                <a:solidFill>
+                  <a:prstClr val="black"/>
+                </a:solidFill>
+                <a:latin typeface="Gabriola" panose="04040605051002020D02" pitchFamily="82" charset="0"/>
+                <a:sym typeface="Wingdings" panose="05000000000000000000" pitchFamily="2" charset="2"/>
+              </a:rPr>
+              <a:t>NUnit</a:t>
+            </a:r>
+            <a:r>
+              <a:rPr lang="de-DE" sz="1800" dirty="0" smtClean="0">
+                <a:solidFill>
+                  <a:prstClr val="black"/>
+                </a:solidFill>
+                <a:latin typeface="Gabriola" panose="04040605051002020D02" pitchFamily="82" charset="0"/>
+                <a:sym typeface="Wingdings" panose="05000000000000000000" pitchFamily="2" charset="2"/>
+              </a:rPr>
+              <a:t>, </a:t>
+            </a:r>
+            <a:r>
+              <a:rPr lang="de-DE" sz="1800" dirty="0" err="1" smtClean="0">
+                <a:solidFill>
+                  <a:prstClr val="black"/>
+                </a:solidFill>
+                <a:latin typeface="Gabriola" panose="04040605051002020D02" pitchFamily="82" charset="0"/>
+                <a:sym typeface="Wingdings" panose="05000000000000000000" pitchFamily="2" charset="2"/>
+              </a:rPr>
+              <a:t>XUnit</a:t>
+            </a:r>
+            <a:r>
+              <a:rPr lang="de-DE" sz="1800" dirty="0" smtClean="0">
+                <a:solidFill>
+                  <a:prstClr val="black"/>
+                </a:solidFill>
+                <a:latin typeface="Gabriola" panose="04040605051002020D02" pitchFamily="82" charset="0"/>
+                <a:sym typeface="Wingdings" panose="05000000000000000000" pitchFamily="2" charset="2"/>
+              </a:rPr>
+              <a:t>. </a:t>
+            </a:r>
+            <a:r>
+              <a:rPr lang="de-DE" sz="1800" dirty="0" err="1" smtClean="0">
+                <a:solidFill>
+                  <a:prstClr val="black"/>
+                </a:solidFill>
+                <a:latin typeface="Gabriola" panose="04040605051002020D02" pitchFamily="82" charset="0"/>
+                <a:sym typeface="Wingdings" panose="05000000000000000000" pitchFamily="2" charset="2"/>
+              </a:rPr>
+              <a:t>Dedicated</a:t>
+            </a:r>
+            <a:r>
+              <a:rPr lang="de-DE" sz="1800" dirty="0" smtClean="0">
+                <a:solidFill>
+                  <a:prstClr val="black"/>
+                </a:solidFill>
+                <a:latin typeface="Gabriola" panose="04040605051002020D02" pitchFamily="82" charset="0"/>
+                <a:sym typeface="Wingdings" panose="05000000000000000000" pitchFamily="2" charset="2"/>
+              </a:rPr>
+              <a:t> </a:t>
+            </a:r>
+            <a:r>
+              <a:rPr lang="de-DE" sz="1800" dirty="0" err="1" smtClean="0">
+                <a:solidFill>
+                  <a:prstClr val="black"/>
+                </a:solidFill>
+                <a:latin typeface="Gabriola" panose="04040605051002020D02" pitchFamily="82" charset="0"/>
+                <a:sym typeface="Wingdings" panose="05000000000000000000" pitchFamily="2" charset="2"/>
+              </a:rPr>
+              <a:t>runner</a:t>
+            </a:r>
+            <a:r>
+              <a:rPr lang="de-DE" sz="1800" dirty="0" smtClean="0">
+                <a:solidFill>
+                  <a:prstClr val="black"/>
+                </a:solidFill>
+                <a:latin typeface="Gabriola" panose="04040605051002020D02" pitchFamily="82" charset="0"/>
+                <a:sym typeface="Wingdings" panose="05000000000000000000" pitchFamily="2" charset="2"/>
+              </a:rPr>
+              <a:t> </a:t>
+            </a:r>
+            <a:r>
+              <a:rPr lang="de-DE" sz="1800" dirty="0" err="1">
+                <a:solidFill>
+                  <a:prstClr val="black"/>
+                </a:solidFill>
+                <a:latin typeface="Gabriola" panose="04040605051002020D02" pitchFamily="82" charset="0"/>
+                <a:sym typeface="Wingdings" panose="05000000000000000000" pitchFamily="2" charset="2"/>
+              </a:rPr>
+              <a:t>w</a:t>
+            </a:r>
+            <a:r>
+              <a:rPr lang="de-DE" sz="1800" dirty="0" err="1" smtClean="0">
+                <a:solidFill>
+                  <a:prstClr val="black"/>
+                </a:solidFill>
+                <a:latin typeface="Gabriola" panose="04040605051002020D02" pitchFamily="82" charset="0"/>
+                <a:sym typeface="Wingdings" panose="05000000000000000000" pitchFamily="2" charset="2"/>
+              </a:rPr>
+              <a:t>ould</a:t>
+            </a:r>
+            <a:r>
+              <a:rPr lang="de-DE" sz="1800" dirty="0" smtClean="0">
+                <a:solidFill>
+                  <a:prstClr val="black"/>
+                </a:solidFill>
+                <a:latin typeface="Gabriola" panose="04040605051002020D02" pitchFamily="82" charset="0"/>
+                <a:sym typeface="Wingdings" panose="05000000000000000000" pitchFamily="2" charset="2"/>
+              </a:rPr>
+              <a:t> </a:t>
+            </a:r>
+            <a:r>
+              <a:rPr lang="de-DE" sz="1800" dirty="0" err="1" smtClean="0">
+                <a:solidFill>
+                  <a:prstClr val="black"/>
+                </a:solidFill>
+                <a:latin typeface="Gabriola" panose="04040605051002020D02" pitchFamily="82" charset="0"/>
+                <a:sym typeface="Wingdings" panose="05000000000000000000" pitchFamily="2" charset="2"/>
+              </a:rPr>
+              <a:t>improve</a:t>
+            </a:r>
+            <a:r>
+              <a:rPr lang="de-DE" sz="1800" dirty="0" smtClean="0">
+                <a:solidFill>
+                  <a:prstClr val="black"/>
+                </a:solidFill>
+                <a:latin typeface="Gabriola" panose="04040605051002020D02" pitchFamily="82" charset="0"/>
+                <a:sym typeface="Wingdings" panose="05000000000000000000" pitchFamily="2" charset="2"/>
+              </a:rPr>
+              <a:t> </a:t>
+            </a:r>
+            <a:r>
+              <a:rPr lang="de-DE" sz="1800" dirty="0" err="1" smtClean="0">
+                <a:solidFill>
+                  <a:prstClr val="black"/>
+                </a:solidFill>
+                <a:latin typeface="Gabriola" panose="04040605051002020D02" pitchFamily="82" charset="0"/>
+                <a:sym typeface="Wingdings" panose="05000000000000000000" pitchFamily="2" charset="2"/>
+              </a:rPr>
+              <a:t>usability</a:t>
+            </a:r>
+            <a:r>
+              <a:rPr lang="de-DE" sz="1800" dirty="0" smtClean="0">
+                <a:solidFill>
+                  <a:prstClr val="black"/>
+                </a:solidFill>
+                <a:latin typeface="Gabriola" panose="04040605051002020D02" pitchFamily="82" charset="0"/>
+                <a:sym typeface="Wingdings" panose="05000000000000000000" pitchFamily="2" charset="2"/>
+              </a:rPr>
+              <a:t> </a:t>
+            </a:r>
+            <a:r>
+              <a:rPr lang="de-DE" sz="1800" dirty="0" err="1" smtClean="0">
+                <a:solidFill>
+                  <a:prstClr val="black"/>
+                </a:solidFill>
+                <a:latin typeface="Gabriola" panose="04040605051002020D02" pitchFamily="82" charset="0"/>
+                <a:sym typeface="Wingdings" panose="05000000000000000000" pitchFamily="2" charset="2"/>
+              </a:rPr>
+              <a:t>within</a:t>
+            </a:r>
+            <a:r>
+              <a:rPr lang="de-DE" sz="1800" dirty="0" smtClean="0">
+                <a:solidFill>
+                  <a:prstClr val="black"/>
+                </a:solidFill>
+                <a:latin typeface="Gabriola" panose="04040605051002020D02" pitchFamily="82" charset="0"/>
+                <a:sym typeface="Wingdings" panose="05000000000000000000" pitchFamily="2" charset="2"/>
+              </a:rPr>
+              <a:t> IDE</a:t>
+            </a:r>
+            <a:endParaRPr lang="de-DE" sz="1800" dirty="0">
+              <a:solidFill>
+                <a:prstClr val="black"/>
+              </a:solidFill>
               <a:latin typeface="Gabriola" panose="04040605051002020D02" pitchFamily="82" charset="0"/>
               <a:sym typeface="Wingdings" panose="05000000000000000000" pitchFamily="2" charset="2"/>
             </a:endParaRPr>
@@ -13840,7 +14938,7 @@
               <a:buFontTx/>
               <a:buChar char="-"/>
             </a:pPr>
-            <a:endParaRPr lang="de-DE" sz="2800" dirty="0" smtClean="0">
+            <a:endParaRPr lang="de-DE" sz="2400" dirty="0" smtClean="0">
               <a:latin typeface="Gabriola" panose="04040605051002020D02" pitchFamily="82" charset="0"/>
               <a:sym typeface="Wingdings" panose="05000000000000000000" pitchFamily="2" charset="2"/>
             </a:endParaRPr>
@@ -17492,6 +18590,528 @@
 </a:theme>
 </file>
 
+<file path=ppt/theme/theme2.xml><?xml version="1.0" encoding="utf-8"?>
+<a:theme xmlns:a="http://schemas.openxmlformats.org/drawingml/2006/main" name="Office Theme">
+  <a:themeElements>
+    <a:clrScheme name="Office">
+      <a:dk1>
+        <a:sysClr val="windowText" lastClr="000000"/>
+      </a:dk1>
+      <a:lt1>
+        <a:sysClr val="window" lastClr="FFFFFF"/>
+      </a:lt1>
+      <a:dk2>
+        <a:srgbClr val="44546A"/>
+      </a:dk2>
+      <a:lt2>
+        <a:srgbClr val="E7E6E6"/>
+      </a:lt2>
+      <a:accent1>
+        <a:srgbClr val="5B9BD5"/>
+      </a:accent1>
+      <a:accent2>
+        <a:srgbClr val="ED7D31"/>
+      </a:accent2>
+      <a:accent3>
+        <a:srgbClr val="A5A5A5"/>
+      </a:accent3>
+      <a:accent4>
+        <a:srgbClr val="FFC000"/>
+      </a:accent4>
+      <a:accent5>
+        <a:srgbClr val="4472C4"/>
+      </a:accent5>
+      <a:accent6>
+        <a:srgbClr val="70AD47"/>
+      </a:accent6>
+      <a:hlink>
+        <a:srgbClr val="0563C1"/>
+      </a:hlink>
+      <a:folHlink>
+        <a:srgbClr val="954F72"/>
+      </a:folHlink>
+    </a:clrScheme>
+    <a:fontScheme name="Office">
+      <a:majorFont>
+        <a:latin typeface="Calibri Light" panose="020F0302020204030204"/>
+        <a:ea typeface=""/>
+        <a:cs typeface=""/>
+        <a:font script="Jpan" typeface="ＭＳ Ｐゴシック"/>
+        <a:font script="Hang" typeface="맑은 고딕"/>
+        <a:font script="Hans" typeface="宋体"/>
+        <a:font script="Hant" typeface="新細明體"/>
+        <a:font script="Arab" typeface="Times New Roman"/>
+        <a:font script="Hebr" typeface="Times New Roman"/>
+        <a:font script="Thai" typeface="Angsana New"/>
+        <a:font script="Ethi" typeface="Nyala"/>
+        <a:font script="Beng" typeface="Vrinda"/>
+        <a:font script="Gujr" typeface="Shruti"/>
+        <a:font script="Khmr" typeface="MoolBoran"/>
+        <a:font script="Knda" typeface="Tunga"/>
+        <a:font script="Guru" typeface="Raavi"/>
+        <a:font script="Cans" typeface="Euphemia"/>
+        <a:font script="Cher" typeface="Plantagenet Cherokee"/>
+        <a:font script="Yiii" typeface="Microsoft Yi Baiti"/>
+        <a:font script="Tibt" typeface="Microsoft Himalaya"/>
+        <a:font script="Thaa" typeface="MV Boli"/>
+        <a:font script="Deva" typeface="Mangal"/>
+        <a:font script="Telu" typeface="Gautami"/>
+        <a:font script="Taml" typeface="Latha"/>
+        <a:font script="Syrc" typeface="Estrangelo Edessa"/>
+        <a:font script="Orya" typeface="Kalinga"/>
+        <a:font script="Mlym" typeface="Kartika"/>
+        <a:font script="Laoo" typeface="DokChampa"/>
+        <a:font script="Sinh" typeface="Iskoola Pota"/>
+        <a:font script="Mong" typeface="Mongolian Baiti"/>
+        <a:font script="Viet" typeface="Times New Roman"/>
+        <a:font script="Uigh" typeface="Microsoft Uighur"/>
+        <a:font script="Geor" typeface="Sylfaen"/>
+      </a:majorFont>
+      <a:minorFont>
+        <a:latin typeface="Calibri" panose="020F0502020204030204"/>
+        <a:ea typeface=""/>
+        <a:cs typeface=""/>
+        <a:font script="Jpan" typeface="ＭＳ Ｐゴシック"/>
+        <a:font script="Hang" typeface="맑은 고딕"/>
+        <a:font script="Hans" typeface="宋体"/>
+        <a:font script="Hant" typeface="新細明體"/>
+        <a:font script="Arab" typeface="Arial"/>
+        <a:font script="Hebr" typeface="Arial"/>
+        <a:font script="Thai" typeface="Cordia New"/>
+        <a:font script="Ethi" typeface="Nyala"/>
+        <a:font script="Beng" typeface="Vrinda"/>
+        <a:font script="Gujr" typeface="Shruti"/>
+        <a:font script="Khmr" typeface="DaunPenh"/>
+        <a:font script="Knda" typeface="Tunga"/>
+        <a:font script="Guru" typeface="Raavi"/>
+        <a:font script="Cans" typeface="Euphemia"/>
+        <a:font script="Cher" typeface="Plantagenet Cherokee"/>
+        <a:font script="Yiii" typeface="Microsoft Yi Baiti"/>
+        <a:font script="Tibt" typeface="Microsoft Himalaya"/>
+        <a:font script="Thaa" typeface="MV Boli"/>
+        <a:font script="Deva" typeface="Mangal"/>
+        <a:font script="Telu" typeface="Gautami"/>
+        <a:font script="Taml" typeface="Latha"/>
+        <a:font script="Syrc" typeface="Estrangelo Edessa"/>
+        <a:font script="Orya" typeface="Kalinga"/>
+        <a:font script="Mlym" typeface="Kartika"/>
+        <a:font script="Laoo" typeface="DokChampa"/>
+        <a:font script="Sinh" typeface="Iskoola Pota"/>
+        <a:font script="Mong" typeface="Mongolian Baiti"/>
+        <a:font script="Viet" typeface="Arial"/>
+        <a:font script="Uigh" typeface="Microsoft Uighur"/>
+        <a:font script="Geor" typeface="Sylfaen"/>
+      </a:minorFont>
+    </a:fontScheme>
+    <a:fmtScheme name="Office">
+      <a:fillStyleLst>
+        <a:solidFill>
+          <a:schemeClr val="phClr"/>
+        </a:solidFill>
+        <a:gradFill rotWithShape="1">
+          <a:gsLst>
+            <a:gs pos="0">
+              <a:schemeClr val="phClr">
+                <a:lumMod val="110000"/>
+                <a:satMod val="105000"/>
+                <a:tint val="67000"/>
+              </a:schemeClr>
+            </a:gs>
+            <a:gs pos="50000">
+              <a:schemeClr val="phClr">
+                <a:lumMod val="105000"/>
+                <a:satMod val="103000"/>
+                <a:tint val="73000"/>
+              </a:schemeClr>
+            </a:gs>
+            <a:gs pos="100000">
+              <a:schemeClr val="phClr">
+                <a:lumMod val="105000"/>
+                <a:satMod val="109000"/>
+                <a:tint val="81000"/>
+              </a:schemeClr>
+            </a:gs>
+          </a:gsLst>
+          <a:lin ang="5400000" scaled="0"/>
+        </a:gradFill>
+        <a:gradFill rotWithShape="1">
+          <a:gsLst>
+            <a:gs pos="0">
+              <a:schemeClr val="phClr">
+                <a:satMod val="103000"/>
+                <a:lumMod val="102000"/>
+                <a:tint val="94000"/>
+              </a:schemeClr>
+            </a:gs>
+            <a:gs pos="50000">
+              <a:schemeClr val="phClr">
+                <a:satMod val="110000"/>
+                <a:lumMod val="100000"/>
+                <a:shade val="100000"/>
+              </a:schemeClr>
+            </a:gs>
+            <a:gs pos="100000">
+              <a:schemeClr val="phClr">
+                <a:lumMod val="99000"/>
+                <a:satMod val="120000"/>
+                <a:shade val="78000"/>
+              </a:schemeClr>
+            </a:gs>
+          </a:gsLst>
+          <a:lin ang="5400000" scaled="0"/>
+        </a:gradFill>
+      </a:fillStyleLst>
+      <a:lnStyleLst>
+        <a:ln w="6350" cap="flat" cmpd="sng" algn="ctr">
+          <a:solidFill>
+            <a:schemeClr val="phClr"/>
+          </a:solidFill>
+          <a:prstDash val="solid"/>
+          <a:miter lim="800000"/>
+        </a:ln>
+        <a:ln w="12700" cap="flat" cmpd="sng" algn="ctr">
+          <a:solidFill>
+            <a:schemeClr val="phClr"/>
+          </a:solidFill>
+          <a:prstDash val="solid"/>
+          <a:miter lim="800000"/>
+        </a:ln>
+        <a:ln w="19050" cap="flat" cmpd="sng" algn="ctr">
+          <a:solidFill>
+            <a:schemeClr val="phClr"/>
+          </a:solidFill>
+          <a:prstDash val="solid"/>
+          <a:miter lim="800000"/>
+        </a:ln>
+      </a:lnStyleLst>
+      <a:effectStyleLst>
+        <a:effectStyle>
+          <a:effectLst/>
+        </a:effectStyle>
+        <a:effectStyle>
+          <a:effectLst/>
+        </a:effectStyle>
+        <a:effectStyle>
+          <a:effectLst>
+            <a:outerShdw blurRad="57150" dist="19050" dir="5400000" algn="ctr" rotWithShape="0">
+              <a:srgbClr val="000000">
+                <a:alpha val="63000"/>
+              </a:srgbClr>
+            </a:outerShdw>
+          </a:effectLst>
+        </a:effectStyle>
+      </a:effectStyleLst>
+      <a:bgFillStyleLst>
+        <a:solidFill>
+          <a:schemeClr val="phClr"/>
+        </a:solidFill>
+        <a:solidFill>
+          <a:schemeClr val="phClr">
+            <a:tint val="95000"/>
+            <a:satMod val="170000"/>
+          </a:schemeClr>
+        </a:solidFill>
+        <a:gradFill rotWithShape="1">
+          <a:gsLst>
+            <a:gs pos="0">
+              <a:schemeClr val="phClr">
+                <a:tint val="93000"/>
+                <a:satMod val="150000"/>
+                <a:shade val="98000"/>
+                <a:lumMod val="102000"/>
+              </a:schemeClr>
+            </a:gs>
+            <a:gs pos="50000">
+              <a:schemeClr val="phClr">
+                <a:tint val="98000"/>
+                <a:satMod val="130000"/>
+                <a:shade val="90000"/>
+                <a:lumMod val="103000"/>
+              </a:schemeClr>
+            </a:gs>
+            <a:gs pos="100000">
+              <a:schemeClr val="phClr">
+                <a:shade val="63000"/>
+                <a:satMod val="120000"/>
+              </a:schemeClr>
+            </a:gs>
+          </a:gsLst>
+          <a:lin ang="5400000" scaled="0"/>
+        </a:gradFill>
+      </a:bgFillStyleLst>
+    </a:fmtScheme>
+  </a:themeElements>
+  <a:objectDefaults/>
+  <a:extraClrSchemeLst/>
+  <a:extLst>
+    <a:ext uri="{05A4C25C-085E-4340-85A3-A5531E510DB2}">
+      <thm15:themeFamily xmlns:thm15="http://schemas.microsoft.com/office/thememl/2012/main" name="Office Theme" id="{62F939B6-93AF-4DB8-9C6B-D6C7DFDC589F}" vid="{4A3C46E8-61CC-4603-A589-7422A47A8E4A}"/>
+    </a:ext>
+  </a:extLst>
+</a:theme>
+</file>
+
+<file path=ppt/theme/theme3.xml><?xml version="1.0" encoding="utf-8"?>
+<a:theme xmlns:a="http://schemas.openxmlformats.org/drawingml/2006/main" name="Office Theme">
+  <a:themeElements>
+    <a:clrScheme name="Office">
+      <a:dk1>
+        <a:sysClr val="windowText" lastClr="000000"/>
+      </a:dk1>
+      <a:lt1>
+        <a:sysClr val="window" lastClr="FFFFFF"/>
+      </a:lt1>
+      <a:dk2>
+        <a:srgbClr val="44546A"/>
+      </a:dk2>
+      <a:lt2>
+        <a:srgbClr val="E7E6E6"/>
+      </a:lt2>
+      <a:accent1>
+        <a:srgbClr val="5B9BD5"/>
+      </a:accent1>
+      <a:accent2>
+        <a:srgbClr val="ED7D31"/>
+      </a:accent2>
+      <a:accent3>
+        <a:srgbClr val="A5A5A5"/>
+      </a:accent3>
+      <a:accent4>
+        <a:srgbClr val="FFC000"/>
+      </a:accent4>
+      <a:accent5>
+        <a:srgbClr val="4472C4"/>
+      </a:accent5>
+      <a:accent6>
+        <a:srgbClr val="70AD47"/>
+      </a:accent6>
+      <a:hlink>
+        <a:srgbClr val="0563C1"/>
+      </a:hlink>
+      <a:folHlink>
+        <a:srgbClr val="954F72"/>
+      </a:folHlink>
+    </a:clrScheme>
+    <a:fontScheme name="Office">
+      <a:majorFont>
+        <a:latin typeface="Calibri Light" panose="020F0302020204030204"/>
+        <a:ea typeface=""/>
+        <a:cs typeface=""/>
+        <a:font script="Jpan" typeface="ＭＳ Ｐゴシック"/>
+        <a:font script="Hang" typeface="맑은 고딕"/>
+        <a:font script="Hans" typeface="宋体"/>
+        <a:font script="Hant" typeface="新細明體"/>
+        <a:font script="Arab" typeface="Times New Roman"/>
+        <a:font script="Hebr" typeface="Times New Roman"/>
+        <a:font script="Thai" typeface="Angsana New"/>
+        <a:font script="Ethi" typeface="Nyala"/>
+        <a:font script="Beng" typeface="Vrinda"/>
+        <a:font script="Gujr" typeface="Shruti"/>
+        <a:font script="Khmr" typeface="MoolBoran"/>
+        <a:font script="Knda" typeface="Tunga"/>
+        <a:font script="Guru" typeface="Raavi"/>
+        <a:font script="Cans" typeface="Euphemia"/>
+        <a:font script="Cher" typeface="Plantagenet Cherokee"/>
+        <a:font script="Yiii" typeface="Microsoft Yi Baiti"/>
+        <a:font script="Tibt" typeface="Microsoft Himalaya"/>
+        <a:font script="Thaa" typeface="MV Boli"/>
+        <a:font script="Deva" typeface="Mangal"/>
+        <a:font script="Telu" typeface="Gautami"/>
+        <a:font script="Taml" typeface="Latha"/>
+        <a:font script="Syrc" typeface="Estrangelo Edessa"/>
+        <a:font script="Orya" typeface="Kalinga"/>
+        <a:font script="Mlym" typeface="Kartika"/>
+        <a:font script="Laoo" typeface="DokChampa"/>
+        <a:font script="Sinh" typeface="Iskoola Pota"/>
+        <a:font script="Mong" typeface="Mongolian Baiti"/>
+        <a:font script="Viet" typeface="Times New Roman"/>
+        <a:font script="Uigh" typeface="Microsoft Uighur"/>
+        <a:font script="Geor" typeface="Sylfaen"/>
+      </a:majorFont>
+      <a:minorFont>
+        <a:latin typeface="Calibri" panose="020F0502020204030204"/>
+        <a:ea typeface=""/>
+        <a:cs typeface=""/>
+        <a:font script="Jpan" typeface="ＭＳ Ｐゴシック"/>
+        <a:font script="Hang" typeface="맑은 고딕"/>
+        <a:font script="Hans" typeface="宋体"/>
+        <a:font script="Hant" typeface="新細明體"/>
+        <a:font script="Arab" typeface="Arial"/>
+        <a:font script="Hebr" typeface="Arial"/>
+        <a:font script="Thai" typeface="Cordia New"/>
+        <a:font script="Ethi" typeface="Nyala"/>
+        <a:font script="Beng" typeface="Vrinda"/>
+        <a:font script="Gujr" typeface="Shruti"/>
+        <a:font script="Khmr" typeface="DaunPenh"/>
+        <a:font script="Knda" typeface="Tunga"/>
+        <a:font script="Guru" typeface="Raavi"/>
+        <a:font script="Cans" typeface="Euphemia"/>
+        <a:font script="Cher" typeface="Plantagenet Cherokee"/>
+        <a:font script="Yiii" typeface="Microsoft Yi Baiti"/>
+        <a:font script="Tibt" typeface="Microsoft Himalaya"/>
+        <a:font script="Thaa" typeface="MV Boli"/>
+        <a:font script="Deva" typeface="Mangal"/>
+        <a:font script="Telu" typeface="Gautami"/>
+        <a:font script="Taml" typeface="Latha"/>
+        <a:font script="Syrc" typeface="Estrangelo Edessa"/>
+        <a:font script="Orya" typeface="Kalinga"/>
+        <a:font script="Mlym" typeface="Kartika"/>
+        <a:font script="Laoo" typeface="DokChampa"/>
+        <a:font script="Sinh" typeface="Iskoola Pota"/>
+        <a:font script="Mong" typeface="Mongolian Baiti"/>
+        <a:font script="Viet" typeface="Arial"/>
+        <a:font script="Uigh" typeface="Microsoft Uighur"/>
+        <a:font script="Geor" typeface="Sylfaen"/>
+      </a:minorFont>
+    </a:fontScheme>
+    <a:fmtScheme name="Office">
+      <a:fillStyleLst>
+        <a:solidFill>
+          <a:schemeClr val="phClr"/>
+        </a:solidFill>
+        <a:gradFill rotWithShape="1">
+          <a:gsLst>
+            <a:gs pos="0">
+              <a:schemeClr val="phClr">
+                <a:lumMod val="110000"/>
+                <a:satMod val="105000"/>
+                <a:tint val="67000"/>
+              </a:schemeClr>
+            </a:gs>
+            <a:gs pos="50000">
+              <a:schemeClr val="phClr">
+                <a:lumMod val="105000"/>
+                <a:satMod val="103000"/>
+                <a:tint val="73000"/>
+              </a:schemeClr>
+            </a:gs>
+            <a:gs pos="100000">
+              <a:schemeClr val="phClr">
+                <a:lumMod val="105000"/>
+                <a:satMod val="109000"/>
+                <a:tint val="81000"/>
+              </a:schemeClr>
+            </a:gs>
+          </a:gsLst>
+          <a:lin ang="5400000" scaled="0"/>
+        </a:gradFill>
+        <a:gradFill rotWithShape="1">
+          <a:gsLst>
+            <a:gs pos="0">
+              <a:schemeClr val="phClr">
+                <a:satMod val="103000"/>
+                <a:lumMod val="102000"/>
+                <a:tint val="94000"/>
+              </a:schemeClr>
+            </a:gs>
+            <a:gs pos="50000">
+              <a:schemeClr val="phClr">
+                <a:satMod val="110000"/>
+                <a:lumMod val="100000"/>
+                <a:shade val="100000"/>
+              </a:schemeClr>
+            </a:gs>
+            <a:gs pos="100000">
+              <a:schemeClr val="phClr">
+                <a:lumMod val="99000"/>
+                <a:satMod val="120000"/>
+                <a:shade val="78000"/>
+              </a:schemeClr>
+            </a:gs>
+          </a:gsLst>
+          <a:lin ang="5400000" scaled="0"/>
+        </a:gradFill>
+      </a:fillStyleLst>
+      <a:lnStyleLst>
+        <a:ln w="6350" cap="flat" cmpd="sng" algn="ctr">
+          <a:solidFill>
+            <a:schemeClr val="phClr"/>
+          </a:solidFill>
+          <a:prstDash val="solid"/>
+          <a:miter lim="800000"/>
+        </a:ln>
+        <a:ln w="12700" cap="flat" cmpd="sng" algn="ctr">
+          <a:solidFill>
+            <a:schemeClr val="phClr"/>
+          </a:solidFill>
+          <a:prstDash val="solid"/>
+          <a:miter lim="800000"/>
+        </a:ln>
+        <a:ln w="19050" cap="flat" cmpd="sng" algn="ctr">
+          <a:solidFill>
+            <a:schemeClr val="phClr"/>
+          </a:solidFill>
+          <a:prstDash val="solid"/>
+          <a:miter lim="800000"/>
+        </a:ln>
+      </a:lnStyleLst>
+      <a:effectStyleLst>
+        <a:effectStyle>
+          <a:effectLst/>
+        </a:effectStyle>
+        <a:effectStyle>
+          <a:effectLst/>
+        </a:effectStyle>
+        <a:effectStyle>
+          <a:effectLst>
+            <a:outerShdw blurRad="57150" dist="19050" dir="5400000" algn="ctr" rotWithShape="0">
+              <a:srgbClr val="000000">
+                <a:alpha val="63000"/>
+              </a:srgbClr>
+            </a:outerShdw>
+          </a:effectLst>
+        </a:effectStyle>
+      </a:effectStyleLst>
+      <a:bgFillStyleLst>
+        <a:solidFill>
+          <a:schemeClr val="phClr"/>
+        </a:solidFill>
+        <a:solidFill>
+          <a:schemeClr val="phClr">
+            <a:tint val="95000"/>
+            <a:satMod val="170000"/>
+          </a:schemeClr>
+        </a:solidFill>
+        <a:gradFill rotWithShape="1">
+          <a:gsLst>
+            <a:gs pos="0">
+              <a:schemeClr val="phClr">
+                <a:tint val="93000"/>
+                <a:satMod val="150000"/>
+                <a:shade val="98000"/>
+                <a:lumMod val="102000"/>
+              </a:schemeClr>
+            </a:gs>
+            <a:gs pos="50000">
+              <a:schemeClr val="phClr">
+                <a:tint val="98000"/>
+                <a:satMod val="130000"/>
+                <a:shade val="90000"/>
+                <a:lumMod val="103000"/>
+              </a:schemeClr>
+            </a:gs>
+            <a:gs pos="100000">
+              <a:schemeClr val="phClr">
+                <a:shade val="63000"/>
+                <a:satMod val="120000"/>
+              </a:schemeClr>
+            </a:gs>
+          </a:gsLst>
+          <a:lin ang="5400000" scaled="0"/>
+        </a:gradFill>
+      </a:bgFillStyleLst>
+    </a:fmtScheme>
+  </a:themeElements>
+  <a:objectDefaults/>
+  <a:extraClrSchemeLst/>
+  <a:extLst>
+    <a:ext uri="{05A4C25C-085E-4340-85A3-A5531E510DB2}">
+      <thm15:themeFamily xmlns:thm15="http://schemas.microsoft.com/office/thememl/2012/main" name="Office Theme" id="{62F939B6-93AF-4DB8-9C6B-D6C7DFDC589F}" vid="{4A3C46E8-61CC-4603-A589-7422A47A8E4A}"/>
+    </a:ext>
+  </a:extLst>
+</a:theme>
+</file>
+
 <file path=ppt/theme/themeOverride1.xml><?xml version="1.0" encoding="utf-8"?>
 <a:themeOverride xmlns:a="http://schemas.openxmlformats.org/drawingml/2006/main">
   <a:clrScheme name="Office">

</xml_diff>